<commit_message>
Modified Logic Class Diagram
</commit_message>
<xml_diff>
--- a/docs/diagrams/LogicClassDiagram.pptx
+++ b/docs/diagrams/LogicClassDiagram.pptx
@@ -5,7 +5,7 @@
     <p:sldMasterId id="2147483648" r:id="rId1"/>
   </p:sldMasterIdLst>
   <p:sldIdLst>
-    <p:sldId id="256" r:id="rId2"/>
+    <p:sldId id="257" r:id="rId2"/>
   </p:sldIdLst>
   <p:sldSz cx="12192000" cy="6858000"/>
   <p:notesSz cx="6858000" cy="9144000"/>
@@ -261,7 +261,7 @@
           <a:p>
             <a:fld id="{2234AB4E-EA5F-4C87-94B4-611343EDF8A2}" type="datetimeFigureOut">
               <a:rPr lang="zh-CN" altLang="en-US" smtClean="0"/>
-              <a:t>2019/10/15</a:t>
+              <a:t>2019/10/23</a:t>
             </a:fld>
             <a:endParaRPr lang="zh-CN" altLang="en-US"/>
           </a:p>
@@ -461,7 +461,7 @@
           <a:p>
             <a:fld id="{2234AB4E-EA5F-4C87-94B4-611343EDF8A2}" type="datetimeFigureOut">
               <a:rPr lang="zh-CN" altLang="en-US" smtClean="0"/>
-              <a:t>2019/10/15</a:t>
+              <a:t>2019/10/23</a:t>
             </a:fld>
             <a:endParaRPr lang="zh-CN" altLang="en-US"/>
           </a:p>
@@ -671,7 +671,7 @@
           <a:p>
             <a:fld id="{2234AB4E-EA5F-4C87-94B4-611343EDF8A2}" type="datetimeFigureOut">
               <a:rPr lang="zh-CN" altLang="en-US" smtClean="0"/>
-              <a:t>2019/10/15</a:t>
+              <a:t>2019/10/23</a:t>
             </a:fld>
             <a:endParaRPr lang="zh-CN" altLang="en-US"/>
           </a:p>
@@ -871,7 +871,7 @@
           <a:p>
             <a:fld id="{2234AB4E-EA5F-4C87-94B4-611343EDF8A2}" type="datetimeFigureOut">
               <a:rPr lang="zh-CN" altLang="en-US" smtClean="0"/>
-              <a:t>2019/10/15</a:t>
+              <a:t>2019/10/23</a:t>
             </a:fld>
             <a:endParaRPr lang="zh-CN" altLang="en-US"/>
           </a:p>
@@ -1147,7 +1147,7 @@
           <a:p>
             <a:fld id="{2234AB4E-EA5F-4C87-94B4-611343EDF8A2}" type="datetimeFigureOut">
               <a:rPr lang="zh-CN" altLang="en-US" smtClean="0"/>
-              <a:t>2019/10/15</a:t>
+              <a:t>2019/10/23</a:t>
             </a:fld>
             <a:endParaRPr lang="zh-CN" altLang="en-US"/>
           </a:p>
@@ -1415,7 +1415,7 @@
           <a:p>
             <a:fld id="{2234AB4E-EA5F-4C87-94B4-611343EDF8A2}" type="datetimeFigureOut">
               <a:rPr lang="zh-CN" altLang="en-US" smtClean="0"/>
-              <a:t>2019/10/15</a:t>
+              <a:t>2019/10/23</a:t>
             </a:fld>
             <a:endParaRPr lang="zh-CN" altLang="en-US"/>
           </a:p>
@@ -1830,7 +1830,7 @@
           <a:p>
             <a:fld id="{2234AB4E-EA5F-4C87-94B4-611343EDF8A2}" type="datetimeFigureOut">
               <a:rPr lang="zh-CN" altLang="en-US" smtClean="0"/>
-              <a:t>2019/10/15</a:t>
+              <a:t>2019/10/23</a:t>
             </a:fld>
             <a:endParaRPr lang="zh-CN" altLang="en-US"/>
           </a:p>
@@ -1972,7 +1972,7 @@
           <a:p>
             <a:fld id="{2234AB4E-EA5F-4C87-94B4-611343EDF8A2}" type="datetimeFigureOut">
               <a:rPr lang="zh-CN" altLang="en-US" smtClean="0"/>
-              <a:t>2019/10/15</a:t>
+              <a:t>2019/10/23</a:t>
             </a:fld>
             <a:endParaRPr lang="zh-CN" altLang="en-US"/>
           </a:p>
@@ -2085,7 +2085,7 @@
           <a:p>
             <a:fld id="{2234AB4E-EA5F-4C87-94B4-611343EDF8A2}" type="datetimeFigureOut">
               <a:rPr lang="zh-CN" altLang="en-US" smtClean="0"/>
-              <a:t>2019/10/15</a:t>
+              <a:t>2019/10/23</a:t>
             </a:fld>
             <a:endParaRPr lang="zh-CN" altLang="en-US"/>
           </a:p>
@@ -2398,7 +2398,7 @@
           <a:p>
             <a:fld id="{2234AB4E-EA5F-4C87-94B4-611343EDF8A2}" type="datetimeFigureOut">
               <a:rPr lang="zh-CN" altLang="en-US" smtClean="0"/>
-              <a:t>2019/10/15</a:t>
+              <a:t>2019/10/23</a:t>
             </a:fld>
             <a:endParaRPr lang="zh-CN" altLang="en-US"/>
           </a:p>
@@ -2687,7 +2687,7 @@
           <a:p>
             <a:fld id="{2234AB4E-EA5F-4C87-94B4-611343EDF8A2}" type="datetimeFigureOut">
               <a:rPr lang="zh-CN" altLang="en-US" smtClean="0"/>
-              <a:t>2019/10/15</a:t>
+              <a:t>2019/10/23</a:t>
             </a:fld>
             <a:endParaRPr lang="zh-CN" altLang="en-US"/>
           </a:p>
@@ -2930,7 +2930,7 @@
           <a:p>
             <a:fld id="{2234AB4E-EA5F-4C87-94B4-611343EDF8A2}" type="datetimeFigureOut">
               <a:rPr lang="zh-CN" altLang="en-US" smtClean="0"/>
-              <a:t>2019/10/15</a:t>
+              <a:t>2019/10/23</a:t>
             </a:fld>
             <a:endParaRPr lang="zh-CN" altLang="en-US"/>
           </a:p>
@@ -3352,7 +3352,7 @@
           <p:cNvPr id="4" name="Rectangle: Rounded Corners 3">
             <a:extLst>
               <a:ext uri="{FF2B5EF4-FFF2-40B4-BE49-F238E27FC236}">
-                <a16:creationId xmlns:a16="http://schemas.microsoft.com/office/drawing/2014/main" id="{F230D36E-424D-4CFF-ADF7-4FA2A43DAC22}"/>
+                <a16:creationId xmlns:a16="http://schemas.microsoft.com/office/drawing/2014/main" id="{F6394B0F-14B4-40FD-B70A-AB0D1E51CC3E}"/>
               </a:ext>
             </a:extLst>
           </p:cNvPr>
@@ -3361,10 +3361,447 @@
         </p:nvSpPr>
         <p:spPr>
           <a:xfrm>
-            <a:off x="1287780" y="175895"/>
-            <a:ext cx="7332345" cy="5801360"/>
+            <a:off x="442762" y="108510"/>
+            <a:ext cx="11213432" cy="5602532"/>
           </a:xfrm>
           <a:prstGeom prst="roundRect">
+            <a:avLst/>
+          </a:prstGeom>
+          <a:solidFill>
+            <a:schemeClr val="accent1">
+              <a:lumMod val="20000"/>
+              <a:lumOff val="80000"/>
+            </a:schemeClr>
+          </a:solidFill>
+        </p:spPr>
+        <p:style>
+          <a:lnRef idx="2">
+            <a:schemeClr val="accent1">
+              <a:shade val="50000"/>
+            </a:schemeClr>
+          </a:lnRef>
+          <a:fillRef idx="1">
+            <a:schemeClr val="accent1"/>
+          </a:fillRef>
+          <a:effectRef idx="0">
+            <a:schemeClr val="accent1"/>
+          </a:effectRef>
+          <a:fontRef idx="minor">
+            <a:schemeClr val="lt1"/>
+          </a:fontRef>
+        </p:style>
+        <p:txBody>
+          <a:bodyPr rtlCol="0" anchor="ctr"/>
+          <a:lstStyle/>
+          <a:p>
+            <a:pPr algn="ctr"/>
+            <a:endParaRPr lang="zh-CN" altLang="en-US" dirty="0">
+              <a:solidFill>
+                <a:srgbClr val="FF0000"/>
+              </a:solidFill>
+            </a:endParaRPr>
+          </a:p>
+        </p:txBody>
+      </p:sp>
+      <p:sp>
+        <p:nvSpPr>
+          <p:cNvPr id="5" name="TextBox 4">
+            <a:extLst>
+              <a:ext uri="{FF2B5EF4-FFF2-40B4-BE49-F238E27FC236}">
+                <a16:creationId xmlns:a16="http://schemas.microsoft.com/office/drawing/2014/main" id="{F1B9E2FB-2695-4F73-AD15-26F17504D865}"/>
+              </a:ext>
+            </a:extLst>
+          </p:cNvPr>
+          <p:cNvSpPr txBox="1"/>
+          <p:nvPr/>
+        </p:nvSpPr>
+        <p:spPr>
+          <a:xfrm>
+            <a:off x="887830" y="318874"/>
+            <a:ext cx="921719" cy="369332"/>
+          </a:xfrm>
+          <a:prstGeom prst="rect">
+            <a:avLst/>
+          </a:prstGeom>
+          <a:noFill/>
+        </p:spPr>
+        <p:txBody>
+          <a:bodyPr wrap="square" rtlCol="0">
+            <a:spAutoFit/>
+          </a:bodyPr>
+          <a:lstStyle/>
+          <a:p>
+            <a:r>
+              <a:rPr lang="en-US" altLang="zh-CN" b="1" dirty="0">
+                <a:solidFill>
+                  <a:schemeClr val="accent1">
+                    <a:lumMod val="75000"/>
+                  </a:schemeClr>
+                </a:solidFill>
+              </a:rPr>
+              <a:t>Logic</a:t>
+            </a:r>
+            <a:endParaRPr lang="zh-CN" altLang="en-US" b="1" dirty="0">
+              <a:solidFill>
+                <a:schemeClr val="accent1">
+                  <a:lumMod val="75000"/>
+                </a:schemeClr>
+              </a:solidFill>
+            </a:endParaRPr>
+          </a:p>
+        </p:txBody>
+      </p:sp>
+      <p:sp>
+        <p:nvSpPr>
+          <p:cNvPr id="6" name="TextBox 5">
+            <a:extLst>
+              <a:ext uri="{FF2B5EF4-FFF2-40B4-BE49-F238E27FC236}">
+                <a16:creationId xmlns:a16="http://schemas.microsoft.com/office/drawing/2014/main" id="{1AA69E96-77B1-4494-9E70-B2DCF4E0525C}"/>
+              </a:ext>
+            </a:extLst>
+          </p:cNvPr>
+          <p:cNvSpPr txBox="1"/>
+          <p:nvPr/>
+        </p:nvSpPr>
+        <p:spPr>
+          <a:xfrm>
+            <a:off x="1114666" y="779646"/>
+            <a:ext cx="461665" cy="4764497"/>
+          </a:xfrm>
+          <a:prstGeom prst="rect">
+            <a:avLst/>
+          </a:prstGeom>
+        </p:spPr>
+        <p:style>
+          <a:lnRef idx="0">
+            <a:schemeClr val="accent1"/>
+          </a:lnRef>
+          <a:fillRef idx="3">
+            <a:schemeClr val="accent1"/>
+          </a:fillRef>
+          <a:effectRef idx="3">
+            <a:schemeClr val="accent1"/>
+          </a:effectRef>
+          <a:fontRef idx="minor">
+            <a:schemeClr val="lt1"/>
+          </a:fontRef>
+        </p:style>
+        <p:txBody>
+          <a:bodyPr vert="vert270" wrap="square" rtlCol="0">
+            <a:spAutoFit/>
+          </a:bodyPr>
+          <a:lstStyle/>
+          <a:p>
+            <a:pPr algn="ctr"/>
+            <a:r>
+              <a:rPr lang="en-SG" altLang="zh-CN" dirty="0" err="1"/>
+              <a:t>LogicManager</a:t>
+            </a:r>
+            <a:endParaRPr lang="en-SG" altLang="zh-CN" dirty="0"/>
+          </a:p>
+        </p:txBody>
+      </p:sp>
+      <p:sp>
+        <p:nvSpPr>
+          <p:cNvPr id="9" name="TextBox 8">
+            <a:extLst>
+              <a:ext uri="{FF2B5EF4-FFF2-40B4-BE49-F238E27FC236}">
+                <a16:creationId xmlns:a16="http://schemas.microsoft.com/office/drawing/2014/main" id="{7B052718-EB6F-493F-BEC3-2499124D9848}"/>
+              </a:ext>
+            </a:extLst>
+          </p:cNvPr>
+          <p:cNvSpPr txBox="1"/>
+          <p:nvPr/>
+        </p:nvSpPr>
+        <p:spPr>
+          <a:xfrm rot="5400000">
+            <a:off x="8985200" y="-719166"/>
+            <a:ext cx="461665" cy="3848100"/>
+          </a:xfrm>
+          <a:prstGeom prst="rect">
+            <a:avLst/>
+          </a:prstGeom>
+        </p:spPr>
+        <p:style>
+          <a:lnRef idx="0">
+            <a:schemeClr val="accent1"/>
+          </a:lnRef>
+          <a:fillRef idx="3">
+            <a:schemeClr val="accent1"/>
+          </a:fillRef>
+          <a:effectRef idx="3">
+            <a:schemeClr val="accent1"/>
+          </a:effectRef>
+          <a:fontRef idx="minor">
+            <a:schemeClr val="lt1"/>
+          </a:fontRef>
+        </p:style>
+        <p:txBody>
+          <a:bodyPr vert="vert270" wrap="square" rtlCol="0">
+            <a:spAutoFit/>
+          </a:bodyPr>
+          <a:lstStyle/>
+          <a:p>
+            <a:pPr algn="ctr"/>
+            <a:r>
+              <a:rPr lang="en-SG" altLang="zh-CN" dirty="0" err="1"/>
+              <a:t>CommandResult</a:t>
+            </a:r>
+            <a:endParaRPr lang="en-SG" altLang="zh-CN" dirty="0"/>
+          </a:p>
+        </p:txBody>
+      </p:sp>
+      <p:cxnSp>
+        <p:nvCxnSpPr>
+          <p:cNvPr id="17" name="Straight Arrow Connector 16">
+            <a:extLst>
+              <a:ext uri="{FF2B5EF4-FFF2-40B4-BE49-F238E27FC236}">
+                <a16:creationId xmlns:a16="http://schemas.microsoft.com/office/drawing/2014/main" id="{7402EE82-2AB6-4A06-A9BC-A665620307E4}"/>
+              </a:ext>
+            </a:extLst>
+          </p:cNvPr>
+          <p:cNvCxnSpPr>
+            <a:cxnSpLocks/>
+          </p:cNvCxnSpPr>
+          <p:nvPr/>
+        </p:nvCxnSpPr>
+        <p:spPr>
+          <a:xfrm>
+            <a:off x="1594702" y="2956275"/>
+            <a:ext cx="696111" cy="0"/>
+          </a:xfrm>
+          <a:prstGeom prst="straightConnector1">
+            <a:avLst/>
+          </a:prstGeom>
+          <a:ln w="28575">
+            <a:headEnd type="none" w="med" len="med"/>
+            <a:tailEnd type="arrow" w="med" len="med"/>
+          </a:ln>
+        </p:spPr>
+        <p:style>
+          <a:lnRef idx="1">
+            <a:schemeClr val="accent1"/>
+          </a:lnRef>
+          <a:fillRef idx="0">
+            <a:schemeClr val="accent1"/>
+          </a:fillRef>
+          <a:effectRef idx="0">
+            <a:schemeClr val="accent1"/>
+          </a:effectRef>
+          <a:fontRef idx="minor">
+            <a:schemeClr val="tx1"/>
+          </a:fontRef>
+        </p:style>
+      </p:cxnSp>
+      <p:sp>
+        <p:nvSpPr>
+          <p:cNvPr id="28" name="Rectangle: Rounded Corners 27">
+            <a:extLst>
+              <a:ext uri="{FF2B5EF4-FFF2-40B4-BE49-F238E27FC236}">
+                <a16:creationId xmlns:a16="http://schemas.microsoft.com/office/drawing/2014/main" id="{B01B7191-C724-4705-8B3C-0AB9B83253EA}"/>
+              </a:ext>
+            </a:extLst>
+          </p:cNvPr>
+          <p:cNvSpPr/>
+          <p:nvPr/>
+        </p:nvSpPr>
+        <p:spPr>
+          <a:xfrm>
+            <a:off x="442762" y="5878095"/>
+            <a:ext cx="11213432" cy="770929"/>
+          </a:xfrm>
+          <a:prstGeom prst="roundRect">
+            <a:avLst/>
+          </a:prstGeom>
+          <a:solidFill>
+            <a:schemeClr val="accent4">
+              <a:lumMod val="20000"/>
+              <a:lumOff val="80000"/>
+            </a:schemeClr>
+          </a:solidFill>
+        </p:spPr>
+        <p:style>
+          <a:lnRef idx="2">
+            <a:schemeClr val="accent1">
+              <a:shade val="50000"/>
+            </a:schemeClr>
+          </a:lnRef>
+          <a:fillRef idx="1">
+            <a:schemeClr val="accent1"/>
+          </a:fillRef>
+          <a:effectRef idx="0">
+            <a:schemeClr val="accent1"/>
+          </a:effectRef>
+          <a:fontRef idx="minor">
+            <a:schemeClr val="lt1"/>
+          </a:fontRef>
+        </p:style>
+        <p:txBody>
+          <a:bodyPr rtlCol="0" anchor="ctr"/>
+          <a:lstStyle/>
+          <a:p>
+            <a:pPr algn="ctr"/>
+            <a:r>
+              <a:rPr lang="en-SG" altLang="zh-CN" dirty="0">
+                <a:solidFill>
+                  <a:srgbClr val="FF0000"/>
+                </a:solidFill>
+              </a:rPr>
+              <a:t>Task</a:t>
+            </a:r>
+            <a:endParaRPr lang="zh-CN" altLang="en-US" dirty="0">
+              <a:solidFill>
+                <a:srgbClr val="FF0000"/>
+              </a:solidFill>
+            </a:endParaRPr>
+          </a:p>
+        </p:txBody>
+      </p:sp>
+      <p:cxnSp>
+        <p:nvCxnSpPr>
+          <p:cNvPr id="29" name="Straight Arrow Connector 28">
+            <a:extLst>
+              <a:ext uri="{FF2B5EF4-FFF2-40B4-BE49-F238E27FC236}">
+                <a16:creationId xmlns:a16="http://schemas.microsoft.com/office/drawing/2014/main" id="{D320A10F-8036-4972-AAA6-9D0D87273A2B}"/>
+              </a:ext>
+            </a:extLst>
+          </p:cNvPr>
+          <p:cNvCxnSpPr>
+            <a:cxnSpLocks/>
+            <a:stCxn id="6" idx="2"/>
+          </p:cNvCxnSpPr>
+          <p:nvPr/>
+        </p:nvCxnSpPr>
+        <p:spPr>
+          <a:xfrm>
+            <a:off x="1345499" y="5544143"/>
+            <a:ext cx="0" cy="404817"/>
+          </a:xfrm>
+          <a:prstGeom prst="straightConnector1">
+            <a:avLst/>
+          </a:prstGeom>
+          <a:ln w="28575">
+            <a:headEnd type="none" w="med" len="med"/>
+            <a:tailEnd type="arrow" w="med" len="med"/>
+          </a:ln>
+        </p:spPr>
+        <p:style>
+          <a:lnRef idx="1">
+            <a:schemeClr val="accent1"/>
+          </a:lnRef>
+          <a:fillRef idx="0">
+            <a:schemeClr val="accent1"/>
+          </a:fillRef>
+          <a:effectRef idx="0">
+            <a:schemeClr val="accent1"/>
+          </a:effectRef>
+          <a:fontRef idx="minor">
+            <a:schemeClr val="tx1"/>
+          </a:fontRef>
+        </p:style>
+      </p:cxnSp>
+      <p:cxnSp>
+        <p:nvCxnSpPr>
+          <p:cNvPr id="54" name="Straight Arrow Connector 53">
+            <a:extLst>
+              <a:ext uri="{FF2B5EF4-FFF2-40B4-BE49-F238E27FC236}">
+                <a16:creationId xmlns:a16="http://schemas.microsoft.com/office/drawing/2014/main" id="{E67E38ED-E4ED-4F51-AB1D-6D9B132E277E}"/>
+              </a:ext>
+            </a:extLst>
+          </p:cNvPr>
+          <p:cNvCxnSpPr>
+            <a:cxnSpLocks/>
+          </p:cNvCxnSpPr>
+          <p:nvPr/>
+        </p:nvCxnSpPr>
+        <p:spPr>
+          <a:xfrm>
+            <a:off x="1576331" y="1227309"/>
+            <a:ext cx="5715651" cy="20128"/>
+          </a:xfrm>
+          <a:prstGeom prst="straightConnector1">
+            <a:avLst/>
+          </a:prstGeom>
+          <a:ln w="28575">
+            <a:prstDash val="sysDot"/>
+            <a:headEnd type="none" w="med" len="med"/>
+            <a:tailEnd type="arrow" w="med" len="med"/>
+          </a:ln>
+        </p:spPr>
+        <p:style>
+          <a:lnRef idx="1">
+            <a:schemeClr val="accent1"/>
+          </a:lnRef>
+          <a:fillRef idx="0">
+            <a:schemeClr val="accent1"/>
+          </a:fillRef>
+          <a:effectRef idx="0">
+            <a:schemeClr val="accent1"/>
+          </a:effectRef>
+          <a:fontRef idx="minor">
+            <a:schemeClr val="tx1"/>
+          </a:fontRef>
+        </p:style>
+      </p:cxnSp>
+      <p:cxnSp>
+        <p:nvCxnSpPr>
+          <p:cNvPr id="69" name="Straight Connector 68">
+            <a:extLst>
+              <a:ext uri="{FF2B5EF4-FFF2-40B4-BE49-F238E27FC236}">
+                <a16:creationId xmlns:a16="http://schemas.microsoft.com/office/drawing/2014/main" id="{97B2197C-E9CA-4F23-92EB-56E39E5B28EF}"/>
+              </a:ext>
+            </a:extLst>
+          </p:cNvPr>
+          <p:cNvCxnSpPr>
+            <a:cxnSpLocks/>
+          </p:cNvCxnSpPr>
+          <p:nvPr/>
+        </p:nvCxnSpPr>
+        <p:spPr>
+          <a:xfrm>
+            <a:off x="9070360" y="3661759"/>
+            <a:ext cx="0" cy="844691"/>
+          </a:xfrm>
+          <a:prstGeom prst="line">
+            <a:avLst/>
+          </a:prstGeom>
+          <a:ln w="28575">
+            <a:prstDash val="solid"/>
+          </a:ln>
+        </p:spPr>
+        <p:style>
+          <a:lnRef idx="1">
+            <a:schemeClr val="accent1"/>
+          </a:lnRef>
+          <a:fillRef idx="0">
+            <a:schemeClr val="accent1"/>
+          </a:fillRef>
+          <a:effectRef idx="0">
+            <a:schemeClr val="accent1"/>
+          </a:effectRef>
+          <a:fontRef idx="minor">
+            <a:schemeClr val="tx1"/>
+          </a:fontRef>
+        </p:style>
+      </p:cxnSp>
+      <p:sp>
+        <p:nvSpPr>
+          <p:cNvPr id="70" name="Isosceles Triangle 69">
+            <a:extLst>
+              <a:ext uri="{FF2B5EF4-FFF2-40B4-BE49-F238E27FC236}">
+                <a16:creationId xmlns:a16="http://schemas.microsoft.com/office/drawing/2014/main" id="{450CE672-17A0-46F3-9F77-878C0769CA06}"/>
+              </a:ext>
+            </a:extLst>
+          </p:cNvPr>
+          <p:cNvSpPr/>
+          <p:nvPr/>
+        </p:nvSpPr>
+        <p:spPr>
+          <a:xfrm rot="10800000">
+            <a:off x="8887482" y="4374354"/>
+            <a:ext cx="365757" cy="269508"/>
+          </a:xfrm>
+          <a:prstGeom prst="triangle">
             <a:avLst/>
           </a:prstGeom>
           <a:solidFill>
@@ -3395,589 +3832,37 @@
           <a:lstStyle/>
           <a:p>
             <a:pPr algn="ctr"/>
-            <a:endParaRPr lang="zh-CN" altLang="en-US" dirty="0">
-              <a:solidFill>
-                <a:srgbClr val="FF0000"/>
-              </a:solidFill>
-            </a:endParaRPr>
-          </a:p>
-        </p:txBody>
-      </p:sp>
-      <p:sp>
-        <p:nvSpPr>
-          <p:cNvPr id="5" name="TextBox 4">
-            <a:extLst>
-              <a:ext uri="{FF2B5EF4-FFF2-40B4-BE49-F238E27FC236}">
-                <a16:creationId xmlns:a16="http://schemas.microsoft.com/office/drawing/2014/main" id="{12DDAC38-2875-4B72-B121-57F674D0C459}"/>
-              </a:ext>
-            </a:extLst>
-          </p:cNvPr>
-          <p:cNvSpPr txBox="1"/>
-          <p:nvPr/>
-        </p:nvSpPr>
-        <p:spPr>
-          <a:xfrm>
-            <a:off x="2333625" y="1152525"/>
-            <a:ext cx="738664" cy="3848100"/>
-          </a:xfrm>
-          <a:prstGeom prst="rect">
-            <a:avLst/>
-          </a:prstGeom>
-        </p:spPr>
-        <p:style>
-          <a:lnRef idx="0">
-            <a:schemeClr val="accent1"/>
-          </a:lnRef>
-          <a:fillRef idx="3">
-            <a:schemeClr val="accent1"/>
-          </a:fillRef>
-          <a:effectRef idx="3">
-            <a:schemeClr val="accent1"/>
-          </a:effectRef>
-          <a:fontRef idx="minor">
-            <a:schemeClr val="lt1"/>
-          </a:fontRef>
-        </p:style>
-        <p:txBody>
-          <a:bodyPr vert="vert270" wrap="square" rtlCol="0">
-            <a:spAutoFit/>
-          </a:bodyPr>
-          <a:lstStyle/>
-          <a:p>
-            <a:pPr algn="ctr"/>
-            <a:r>
-              <a:rPr lang="en-SG" altLang="zh-CN" dirty="0"/>
-              <a:t>&lt;&lt;interface&gt;&gt;</a:t>
-            </a:r>
-          </a:p>
-          <a:p>
-            <a:pPr algn="ctr"/>
-            <a:r>
-              <a:rPr lang="en-SG" altLang="zh-CN" dirty="0" err="1"/>
-              <a:t>CommandParser</a:t>
-            </a:r>
-            <a:endParaRPr lang="zh-CN" altLang="en-US" dirty="0"/>
+            <a:endParaRPr lang="en-SG"/>
           </a:p>
         </p:txBody>
       </p:sp>
       <p:cxnSp>
         <p:nvCxnSpPr>
-          <p:cNvPr id="7" name="Straight Arrow Connector 6">
-            <a:extLst>
-              <a:ext uri="{FF2B5EF4-FFF2-40B4-BE49-F238E27FC236}">
-                <a16:creationId xmlns:a16="http://schemas.microsoft.com/office/drawing/2014/main" id="{D70F9272-74C0-4B60-8C95-C8958140F4D4}"/>
+          <p:cNvPr id="71" name="Straight Arrow Connector 70">
+            <a:extLst>
+              <a:ext uri="{FF2B5EF4-FFF2-40B4-BE49-F238E27FC236}">
+                <a16:creationId xmlns:a16="http://schemas.microsoft.com/office/drawing/2014/main" id="{181133DA-BA47-42E5-8787-53055E7C51D1}"/>
               </a:ext>
             </a:extLst>
           </p:cNvPr>
           <p:cNvCxnSpPr>
             <a:cxnSpLocks/>
-            <a:endCxn id="5" idx="1"/>
+            <a:endCxn id="77" idx="2"/>
           </p:cNvCxnSpPr>
           <p:nvPr/>
         </p:nvCxnSpPr>
         <p:spPr>
           <a:xfrm>
-            <a:off x="885825" y="3076575"/>
-            <a:ext cx="1447800" cy="0"/>
+            <a:off x="2715487" y="3430926"/>
+            <a:ext cx="1300848" cy="868"/>
           </a:xfrm>
           <a:prstGeom prst="straightConnector1">
             <a:avLst/>
           </a:prstGeom>
           <a:ln w="28575">
-            <a:solidFill>
-              <a:schemeClr val="tx1"/>
-            </a:solidFill>
-            <a:prstDash val="dash"/>
-            <a:tailEnd type="triangle"/>
-          </a:ln>
-        </p:spPr>
-        <p:style>
-          <a:lnRef idx="1">
-            <a:schemeClr val="accent1"/>
-          </a:lnRef>
-          <a:fillRef idx="0">
-            <a:schemeClr val="accent1"/>
-          </a:fillRef>
-          <a:effectRef idx="0">
-            <a:schemeClr val="accent1"/>
-          </a:effectRef>
-          <a:fontRef idx="minor">
-            <a:schemeClr val="tx1"/>
-          </a:fontRef>
-        </p:style>
-      </p:cxnSp>
-      <p:sp>
-        <p:nvSpPr>
-          <p:cNvPr id="11" name="Isosceles Triangle 10">
-            <a:extLst>
-              <a:ext uri="{FF2B5EF4-FFF2-40B4-BE49-F238E27FC236}">
-                <a16:creationId xmlns:a16="http://schemas.microsoft.com/office/drawing/2014/main" id="{F561CBAA-2B69-43C8-8986-9CDE6AFB6F8C}"/>
-              </a:ext>
-            </a:extLst>
-          </p:cNvPr>
-          <p:cNvSpPr/>
-          <p:nvPr/>
-        </p:nvSpPr>
-        <p:spPr>
-          <a:xfrm rot="16200000">
-            <a:off x="3022040" y="2757492"/>
-            <a:ext cx="738664" cy="638166"/>
-          </a:xfrm>
-          <a:prstGeom prst="triangle">
-            <a:avLst/>
-          </a:prstGeom>
-        </p:spPr>
-        <p:style>
-          <a:lnRef idx="2">
-            <a:schemeClr val="accent1">
-              <a:shade val="50000"/>
-            </a:schemeClr>
-          </a:lnRef>
-          <a:fillRef idx="1">
-            <a:schemeClr val="accent1"/>
-          </a:fillRef>
-          <a:effectRef idx="0">
-            <a:schemeClr val="accent1"/>
-          </a:effectRef>
-          <a:fontRef idx="minor">
-            <a:schemeClr val="lt1"/>
-          </a:fontRef>
-        </p:style>
-        <p:txBody>
-          <a:bodyPr rtlCol="0" anchor="ctr"/>
-          <a:lstStyle/>
-          <a:p>
-            <a:pPr algn="ctr"/>
-            <a:endParaRPr lang="zh-CN" altLang="en-US"/>
-          </a:p>
-        </p:txBody>
-      </p:sp>
-      <p:cxnSp>
-        <p:nvCxnSpPr>
-          <p:cNvPr id="13" name="Straight Connector 12">
-            <a:extLst>
-              <a:ext uri="{FF2B5EF4-FFF2-40B4-BE49-F238E27FC236}">
-                <a16:creationId xmlns:a16="http://schemas.microsoft.com/office/drawing/2014/main" id="{B52419CC-7C20-47F5-9F65-691C7A848232}"/>
-              </a:ext>
-            </a:extLst>
-          </p:cNvPr>
-          <p:cNvCxnSpPr>
-            <a:stCxn id="11" idx="3"/>
-          </p:cNvCxnSpPr>
-          <p:nvPr/>
-        </p:nvCxnSpPr>
-        <p:spPr>
-          <a:xfrm flipV="1">
-            <a:off x="3710455" y="3076574"/>
-            <a:ext cx="899645" cy="1"/>
-          </a:xfrm>
-          <a:prstGeom prst="line">
-            <a:avLst/>
-          </a:prstGeom>
-          <a:ln w="38100">
-            <a:solidFill>
-              <a:schemeClr val="accent1"/>
-            </a:solidFill>
-            <a:prstDash val="sysDash"/>
-          </a:ln>
-        </p:spPr>
-        <p:style>
-          <a:lnRef idx="1">
-            <a:schemeClr val="accent1"/>
-          </a:lnRef>
-          <a:fillRef idx="0">
-            <a:schemeClr val="accent1"/>
-          </a:fillRef>
-          <a:effectRef idx="0">
-            <a:schemeClr val="accent1"/>
-          </a:effectRef>
-          <a:fontRef idx="minor">
-            <a:schemeClr val="tx1"/>
-          </a:fontRef>
-        </p:style>
-      </p:cxnSp>
-      <p:sp>
-        <p:nvSpPr>
-          <p:cNvPr id="14" name="TextBox 13">
-            <a:extLst>
-              <a:ext uri="{FF2B5EF4-FFF2-40B4-BE49-F238E27FC236}">
-                <a16:creationId xmlns:a16="http://schemas.microsoft.com/office/drawing/2014/main" id="{5F5E5E07-9D94-46DA-A87B-C3F41BBFF32E}"/>
-              </a:ext>
-            </a:extLst>
-          </p:cNvPr>
-          <p:cNvSpPr txBox="1"/>
-          <p:nvPr/>
-        </p:nvSpPr>
-        <p:spPr>
-          <a:xfrm>
-            <a:off x="4348621" y="1152524"/>
-            <a:ext cx="461665" cy="3848100"/>
-          </a:xfrm>
-          <a:prstGeom prst="rect">
-            <a:avLst/>
-          </a:prstGeom>
-        </p:spPr>
-        <p:style>
-          <a:lnRef idx="0">
-            <a:schemeClr val="accent1"/>
-          </a:lnRef>
-          <a:fillRef idx="3">
-            <a:schemeClr val="accent1"/>
-          </a:fillRef>
-          <a:effectRef idx="3">
-            <a:schemeClr val="accent1"/>
-          </a:effectRef>
-          <a:fontRef idx="minor">
-            <a:schemeClr val="lt1"/>
-          </a:fontRef>
-        </p:style>
-        <p:txBody>
-          <a:bodyPr vert="vert270" wrap="square" rtlCol="0">
-            <a:spAutoFit/>
-          </a:bodyPr>
-          <a:lstStyle/>
-          <a:p>
-            <a:pPr algn="ctr"/>
-            <a:r>
-              <a:rPr lang="en-US" altLang="zh-CN" dirty="0" err="1"/>
-              <a:t>ParserManager</a:t>
-            </a:r>
-            <a:endParaRPr lang="zh-CN" altLang="en-US" dirty="0"/>
-          </a:p>
-        </p:txBody>
-      </p:sp>
-      <p:cxnSp>
-        <p:nvCxnSpPr>
-          <p:cNvPr id="20" name="Straight Arrow Connector 19">
-            <a:extLst>
-              <a:ext uri="{FF2B5EF4-FFF2-40B4-BE49-F238E27FC236}">
-                <a16:creationId xmlns:a16="http://schemas.microsoft.com/office/drawing/2014/main" id="{7CBB0C2D-E839-47F2-BE32-2B946FFEEAE3}"/>
-              </a:ext>
-            </a:extLst>
-          </p:cNvPr>
-          <p:cNvCxnSpPr>
-            <a:cxnSpLocks/>
-          </p:cNvCxnSpPr>
-          <p:nvPr/>
-        </p:nvCxnSpPr>
-        <p:spPr>
-          <a:xfrm>
-            <a:off x="4810286" y="4362450"/>
-            <a:ext cx="809464" cy="0"/>
-          </a:xfrm>
-          <a:prstGeom prst="straightConnector1">
-            <a:avLst/>
-          </a:prstGeom>
-          <a:ln w="28575">
-            <a:solidFill>
-              <a:schemeClr val="accent1"/>
-            </a:solidFill>
-            <a:prstDash val="solid"/>
-            <a:tailEnd type="triangle"/>
-          </a:ln>
-        </p:spPr>
-        <p:style>
-          <a:lnRef idx="1">
-            <a:schemeClr val="accent1"/>
-          </a:lnRef>
-          <a:fillRef idx="0">
-            <a:schemeClr val="accent1"/>
-          </a:fillRef>
-          <a:effectRef idx="0">
-            <a:schemeClr val="accent1"/>
-          </a:effectRef>
-          <a:fontRef idx="minor">
-            <a:schemeClr val="tx1"/>
-          </a:fontRef>
-        </p:style>
-      </p:cxnSp>
-      <p:sp>
-        <p:nvSpPr>
-          <p:cNvPr id="24" name="Rectangle 23">
-            <a:extLst>
-              <a:ext uri="{FF2B5EF4-FFF2-40B4-BE49-F238E27FC236}">
-                <a16:creationId xmlns:a16="http://schemas.microsoft.com/office/drawing/2014/main" id="{2C81D320-2006-4542-ADAA-38168F816293}"/>
-              </a:ext>
-            </a:extLst>
-          </p:cNvPr>
-          <p:cNvSpPr/>
-          <p:nvPr/>
-        </p:nvSpPr>
-        <p:spPr>
-          <a:xfrm>
-            <a:off x="5619750" y="4052899"/>
-            <a:ext cx="2105025" cy="619101"/>
-          </a:xfrm>
-          <a:prstGeom prst="rect">
-            <a:avLst/>
-          </a:prstGeom>
-        </p:spPr>
-        <p:style>
-          <a:lnRef idx="2">
-            <a:schemeClr val="accent1">
-              <a:shade val="50000"/>
-            </a:schemeClr>
-          </a:lnRef>
-          <a:fillRef idx="1">
-            <a:schemeClr val="accent1"/>
-          </a:fillRef>
-          <a:effectRef idx="0">
-            <a:schemeClr val="accent1"/>
-          </a:effectRef>
-          <a:fontRef idx="minor">
-            <a:schemeClr val="lt1"/>
-          </a:fontRef>
-        </p:style>
-        <p:txBody>
-          <a:bodyPr rtlCol="0" anchor="ctr"/>
-          <a:lstStyle/>
-          <a:p>
-            <a:pPr algn="ctr"/>
-            <a:r>
-              <a:rPr lang="en-US" altLang="zh-CN" dirty="0" err="1"/>
-              <a:t>XCommand</a:t>
-            </a:r>
-            <a:endParaRPr lang="zh-CN" altLang="en-US" dirty="0"/>
-          </a:p>
-        </p:txBody>
-      </p:sp>
-      <p:cxnSp>
-        <p:nvCxnSpPr>
-          <p:cNvPr id="25" name="Straight Arrow Connector 24">
-            <a:extLst>
-              <a:ext uri="{FF2B5EF4-FFF2-40B4-BE49-F238E27FC236}">
-                <a16:creationId xmlns:a16="http://schemas.microsoft.com/office/drawing/2014/main" id="{5DF5FE8F-4030-4A0E-A989-9FD924F5BA67}"/>
-              </a:ext>
-            </a:extLst>
-          </p:cNvPr>
-          <p:cNvCxnSpPr>
-            <a:cxnSpLocks/>
-          </p:cNvCxnSpPr>
-          <p:nvPr/>
-        </p:nvCxnSpPr>
-        <p:spPr>
-          <a:xfrm flipV="1">
-            <a:off x="6672262" y="3179207"/>
-            <a:ext cx="0" cy="893207"/>
-          </a:xfrm>
-          <a:prstGeom prst="straightConnector1">
-            <a:avLst/>
-          </a:prstGeom>
-          <a:ln w="28575">
-            <a:solidFill>
-              <a:schemeClr val="accent1"/>
-            </a:solidFill>
-            <a:prstDash val="solid"/>
-            <a:tailEnd type="triangle"/>
-          </a:ln>
-        </p:spPr>
-        <p:style>
-          <a:lnRef idx="1">
-            <a:schemeClr val="accent1"/>
-          </a:lnRef>
-          <a:fillRef idx="0">
-            <a:schemeClr val="accent1"/>
-          </a:fillRef>
-          <a:effectRef idx="0">
-            <a:schemeClr val="accent1"/>
-          </a:effectRef>
-          <a:fontRef idx="minor">
-            <a:schemeClr val="tx1"/>
-          </a:fontRef>
-        </p:style>
-      </p:cxnSp>
-      <p:sp>
-        <p:nvSpPr>
-          <p:cNvPr id="27" name="Isosceles Triangle 26">
-            <a:extLst>
-              <a:ext uri="{FF2B5EF4-FFF2-40B4-BE49-F238E27FC236}">
-                <a16:creationId xmlns:a16="http://schemas.microsoft.com/office/drawing/2014/main" id="{2FE63049-FC51-4A46-AA56-2BB1D2749129}"/>
-              </a:ext>
-            </a:extLst>
-          </p:cNvPr>
-          <p:cNvSpPr/>
-          <p:nvPr/>
-        </p:nvSpPr>
-        <p:spPr>
-          <a:xfrm>
-            <a:off x="6302930" y="2658804"/>
-            <a:ext cx="738664" cy="638166"/>
-          </a:xfrm>
-          <a:prstGeom prst="triangle">
-            <a:avLst/>
-          </a:prstGeom>
-        </p:spPr>
-        <p:style>
-          <a:lnRef idx="2">
-            <a:schemeClr val="accent1">
-              <a:shade val="50000"/>
-            </a:schemeClr>
-          </a:lnRef>
-          <a:fillRef idx="1">
-            <a:schemeClr val="accent1"/>
-          </a:fillRef>
-          <a:effectRef idx="0">
-            <a:schemeClr val="accent1"/>
-          </a:effectRef>
-          <a:fontRef idx="minor">
-            <a:schemeClr val="lt1"/>
-          </a:fontRef>
-        </p:style>
-        <p:txBody>
-          <a:bodyPr rtlCol="0" anchor="ctr"/>
-          <a:lstStyle/>
-          <a:p>
-            <a:pPr algn="ctr"/>
-            <a:endParaRPr lang="zh-CN" altLang="en-US"/>
-          </a:p>
-        </p:txBody>
-      </p:sp>
-      <p:sp>
-        <p:nvSpPr>
-          <p:cNvPr id="29" name="Rectangle 28">
-            <a:extLst>
-              <a:ext uri="{FF2B5EF4-FFF2-40B4-BE49-F238E27FC236}">
-                <a16:creationId xmlns:a16="http://schemas.microsoft.com/office/drawing/2014/main" id="{E75F18E3-A06E-4386-B803-D184F2B4921F}"/>
-              </a:ext>
-            </a:extLst>
-          </p:cNvPr>
-          <p:cNvSpPr/>
-          <p:nvPr/>
-        </p:nvSpPr>
-        <p:spPr>
-          <a:xfrm>
-            <a:off x="5621655" y="2039703"/>
-            <a:ext cx="2105025" cy="619101"/>
-          </a:xfrm>
-          <a:prstGeom prst="rect">
-            <a:avLst/>
-          </a:prstGeom>
-        </p:spPr>
-        <p:style>
-          <a:lnRef idx="2">
-            <a:schemeClr val="accent1">
-              <a:shade val="50000"/>
-            </a:schemeClr>
-          </a:lnRef>
-          <a:fillRef idx="1">
-            <a:schemeClr val="accent1"/>
-          </a:fillRef>
-          <a:effectRef idx="0">
-            <a:schemeClr val="accent1"/>
-          </a:effectRef>
-          <a:fontRef idx="minor">
-            <a:schemeClr val="lt1"/>
-          </a:fontRef>
-        </p:style>
-        <p:txBody>
-          <a:bodyPr rtlCol="0" anchor="ctr"/>
-          <a:lstStyle/>
-          <a:p>
-            <a:pPr algn="ctr"/>
-            <a:r>
-              <a:rPr lang="en-US" altLang="zh-CN" dirty="0"/>
-              <a:t>{abstract}</a:t>
-            </a:r>
-          </a:p>
-          <a:p>
-            <a:pPr algn="ctr"/>
-            <a:r>
-              <a:rPr lang="en-US" altLang="zh-CN" dirty="0"/>
-              <a:t>Command</a:t>
-            </a:r>
-            <a:endParaRPr lang="zh-CN" altLang="en-US" dirty="0"/>
-          </a:p>
-        </p:txBody>
-      </p:sp>
-      <p:sp>
-        <p:nvSpPr>
-          <p:cNvPr id="30" name="Rectangle: Rounded Corners 29">
-            <a:extLst>
-              <a:ext uri="{FF2B5EF4-FFF2-40B4-BE49-F238E27FC236}">
-                <a16:creationId xmlns:a16="http://schemas.microsoft.com/office/drawing/2014/main" id="{B53E32D7-BE65-426F-B397-669F3953ECEE}"/>
-              </a:ext>
-            </a:extLst>
-          </p:cNvPr>
-          <p:cNvSpPr/>
-          <p:nvPr/>
-        </p:nvSpPr>
-        <p:spPr>
-          <a:xfrm>
-            <a:off x="8903571" y="175894"/>
-            <a:ext cx="762400" cy="5801360"/>
-          </a:xfrm>
-          <a:prstGeom prst="roundRect">
-            <a:avLst/>
-          </a:prstGeom>
-          <a:solidFill>
-            <a:srgbClr val="FFC000"/>
-          </a:solidFill>
-        </p:spPr>
-        <p:style>
-          <a:lnRef idx="2">
-            <a:schemeClr val="accent1">
-              <a:shade val="50000"/>
-            </a:schemeClr>
-          </a:lnRef>
-          <a:fillRef idx="1">
-            <a:schemeClr val="accent1"/>
-          </a:fillRef>
-          <a:effectRef idx="0">
-            <a:schemeClr val="accent1"/>
-          </a:effectRef>
-          <a:fontRef idx="minor">
-            <a:schemeClr val="lt1"/>
-          </a:fontRef>
-        </p:style>
-        <p:txBody>
-          <a:bodyPr vert="vert270" rtlCol="0" anchor="ctr"/>
-          <a:lstStyle/>
-          <a:p>
-            <a:pPr algn="ctr"/>
-            <a:r>
-              <a:rPr lang="en-US" altLang="zh-CN" dirty="0">
-                <a:solidFill>
-                  <a:schemeClr val="bg1"/>
-                </a:solidFill>
-              </a:rPr>
-              <a:t>model</a:t>
-            </a:r>
-            <a:endParaRPr lang="zh-CN" altLang="en-US" dirty="0">
-              <a:solidFill>
-                <a:schemeClr val="bg1"/>
-              </a:solidFill>
-            </a:endParaRPr>
-          </a:p>
-        </p:txBody>
-      </p:sp>
-      <p:cxnSp>
-        <p:nvCxnSpPr>
-          <p:cNvPr id="31" name="Straight Arrow Connector 30">
-            <a:extLst>
-              <a:ext uri="{FF2B5EF4-FFF2-40B4-BE49-F238E27FC236}">
-                <a16:creationId xmlns:a16="http://schemas.microsoft.com/office/drawing/2014/main" id="{1823693F-24C1-4861-98DF-53F59C861143}"/>
-              </a:ext>
-            </a:extLst>
-          </p:cNvPr>
-          <p:cNvCxnSpPr>
-            <a:cxnSpLocks/>
-          </p:cNvCxnSpPr>
-          <p:nvPr/>
-        </p:nvCxnSpPr>
-        <p:spPr>
-          <a:xfrm>
-            <a:off x="7724775" y="4362450"/>
-            <a:ext cx="1178796" cy="0"/>
-          </a:xfrm>
-          <a:prstGeom prst="straightConnector1">
-            <a:avLst/>
-          </a:prstGeom>
-          <a:ln w="28575">
-            <a:solidFill>
-              <a:schemeClr val="accent1"/>
-            </a:solidFill>
-            <a:prstDash val="solid"/>
-            <a:tailEnd type="triangle"/>
+            <a:prstDash val="sysDot"/>
+            <a:headEnd type="none" w="med" len="med"/>
+            <a:tailEnd type="arrow" w="med" len="med"/>
           </a:ln>
         </p:spPr>
         <p:style>
@@ -3997,32 +3882,31 @@
       </p:cxnSp>
       <p:cxnSp>
         <p:nvCxnSpPr>
-          <p:cNvPr id="15" name="Straight Arrow Connector 14">
-            <a:extLst>
-              <a:ext uri="{FF2B5EF4-FFF2-40B4-BE49-F238E27FC236}">
-                <a16:creationId xmlns:a16="http://schemas.microsoft.com/office/drawing/2014/main" id="{0CA2290A-21AA-47BE-B940-0DC9E704A4FA}"/>
+          <p:cNvPr id="72" name="Straight Arrow Connector 71">
+            <a:extLst>
+              <a:ext uri="{FF2B5EF4-FFF2-40B4-BE49-F238E27FC236}">
+                <a16:creationId xmlns:a16="http://schemas.microsoft.com/office/drawing/2014/main" id="{D2DA600E-0E07-4D0C-8B20-B67B8D3ECF1D}"/>
               </a:ext>
             </a:extLst>
           </p:cNvPr>
           <p:cNvCxnSpPr>
             <a:cxnSpLocks/>
+            <a:endCxn id="75" idx="2"/>
           </p:cNvCxnSpPr>
           <p:nvPr/>
         </p:nvCxnSpPr>
         <p:spPr>
           <a:xfrm>
-            <a:off x="6672262" y="4672000"/>
-            <a:ext cx="0" cy="1624025"/>
+            <a:off x="1643643" y="5018098"/>
+            <a:ext cx="5895980" cy="1"/>
           </a:xfrm>
           <a:prstGeom prst="straightConnector1">
             <a:avLst/>
           </a:prstGeom>
           <a:ln w="28575">
-            <a:solidFill>
-              <a:schemeClr val="accent1"/>
-            </a:solidFill>
-            <a:prstDash val="solid"/>
-            <a:tailEnd type="triangle"/>
+            <a:prstDash val="sysDot"/>
+            <a:headEnd type="none" w="med" len="med"/>
+            <a:tailEnd type="arrow" w="med" len="med"/>
           </a:ln>
         </p:spPr>
         <p:style>
@@ -4040,12 +3924,356 @@
           </a:fontRef>
         </p:style>
       </p:cxnSp>
-      <p:sp>
-        <p:nvSpPr>
-          <p:cNvPr id="3" name="Rectangle: Rounded Corners 2">
-            <a:extLst>
-              <a:ext uri="{FF2B5EF4-FFF2-40B4-BE49-F238E27FC236}">
-                <a16:creationId xmlns:a16="http://schemas.microsoft.com/office/drawing/2014/main" id="{7C117056-094D-4B5D-9AB3-85DBDDE44A48}"/>
+      <p:cxnSp>
+        <p:nvCxnSpPr>
+          <p:cNvPr id="73" name="Straight Connector 72">
+            <a:extLst>
+              <a:ext uri="{FF2B5EF4-FFF2-40B4-BE49-F238E27FC236}">
+                <a16:creationId xmlns:a16="http://schemas.microsoft.com/office/drawing/2014/main" id="{C5D15119-838A-47F4-A072-962760F12732}"/>
+              </a:ext>
+            </a:extLst>
+          </p:cNvPr>
+          <p:cNvCxnSpPr>
+            <a:cxnSpLocks/>
+          </p:cNvCxnSpPr>
+          <p:nvPr/>
+        </p:nvCxnSpPr>
+        <p:spPr>
+          <a:xfrm>
+            <a:off x="10552196" y="5066690"/>
+            <a:ext cx="302106" cy="0"/>
+          </a:xfrm>
+          <a:prstGeom prst="line">
+            <a:avLst/>
+          </a:prstGeom>
+          <a:ln w="28575">
+            <a:prstDash val="sysDot"/>
+          </a:ln>
+        </p:spPr>
+        <p:style>
+          <a:lnRef idx="1">
+            <a:schemeClr val="accent1"/>
+          </a:lnRef>
+          <a:fillRef idx="0">
+            <a:schemeClr val="accent1"/>
+          </a:fillRef>
+          <a:effectRef idx="0">
+            <a:schemeClr val="accent1"/>
+          </a:effectRef>
+          <a:fontRef idx="minor">
+            <a:schemeClr val="tx1"/>
+          </a:fontRef>
+        </p:style>
+      </p:cxnSp>
+      <p:sp>
+        <p:nvSpPr>
+          <p:cNvPr id="74" name="TextBox 73">
+            <a:extLst>
+              <a:ext uri="{FF2B5EF4-FFF2-40B4-BE49-F238E27FC236}">
+                <a16:creationId xmlns:a16="http://schemas.microsoft.com/office/drawing/2014/main" id="{C8985E7A-77FC-4B06-9C83-9071021B97DD}"/>
+              </a:ext>
+            </a:extLst>
+          </p:cNvPr>
+          <p:cNvSpPr txBox="1"/>
+          <p:nvPr/>
+        </p:nvSpPr>
+        <p:spPr>
+          <a:xfrm rot="5400000">
+            <a:off x="5022034" y="660781"/>
+            <a:ext cx="738664" cy="2754168"/>
+          </a:xfrm>
+          <a:prstGeom prst="rect">
+            <a:avLst/>
+          </a:prstGeom>
+        </p:spPr>
+        <p:style>
+          <a:lnRef idx="0">
+            <a:schemeClr val="accent1"/>
+          </a:lnRef>
+          <a:fillRef idx="3">
+            <a:schemeClr val="accent1"/>
+          </a:fillRef>
+          <a:effectRef idx="3">
+            <a:schemeClr val="accent1"/>
+          </a:effectRef>
+          <a:fontRef idx="minor">
+            <a:schemeClr val="lt1"/>
+          </a:fontRef>
+        </p:style>
+        <p:txBody>
+          <a:bodyPr vert="vert270" wrap="square" rtlCol="0">
+            <a:spAutoFit/>
+          </a:bodyPr>
+          <a:lstStyle/>
+          <a:p>
+            <a:pPr algn="ctr"/>
+            <a:r>
+              <a:rPr lang="en-SG" altLang="zh-CN" dirty="0"/>
+              <a:t>&lt;&lt;interface&gt;&gt;</a:t>
+            </a:r>
+          </a:p>
+          <a:p>
+            <a:pPr algn="ctr"/>
+            <a:r>
+              <a:rPr lang="en-SG" altLang="zh-CN" dirty="0" err="1"/>
+              <a:t>CommandParser</a:t>
+            </a:r>
+            <a:endParaRPr lang="zh-CN" altLang="en-US" dirty="0"/>
+          </a:p>
+        </p:txBody>
+      </p:sp>
+      <p:sp>
+        <p:nvSpPr>
+          <p:cNvPr id="75" name="TextBox 74">
+            <a:extLst>
+              <a:ext uri="{FF2B5EF4-FFF2-40B4-BE49-F238E27FC236}">
+                <a16:creationId xmlns:a16="http://schemas.microsoft.com/office/drawing/2014/main" id="{4BF59EDD-9118-4385-A61F-4683D5AB8117}"/>
+              </a:ext>
+            </a:extLst>
+          </p:cNvPr>
+          <p:cNvSpPr txBox="1"/>
+          <p:nvPr/>
+        </p:nvSpPr>
+        <p:spPr>
+          <a:xfrm rot="5400000">
+            <a:off x="8721918" y="3466471"/>
+            <a:ext cx="738664" cy="3103255"/>
+          </a:xfrm>
+          <a:prstGeom prst="rect">
+            <a:avLst/>
+          </a:prstGeom>
+        </p:spPr>
+        <p:style>
+          <a:lnRef idx="0">
+            <a:schemeClr val="accent1"/>
+          </a:lnRef>
+          <a:fillRef idx="3">
+            <a:schemeClr val="accent1"/>
+          </a:fillRef>
+          <a:effectRef idx="3">
+            <a:schemeClr val="accent1"/>
+          </a:effectRef>
+          <a:fontRef idx="minor">
+            <a:schemeClr val="lt1"/>
+          </a:fontRef>
+        </p:style>
+        <p:txBody>
+          <a:bodyPr vert="vert270" wrap="square" rtlCol="0">
+            <a:spAutoFit/>
+          </a:bodyPr>
+          <a:lstStyle/>
+          <a:p>
+            <a:pPr algn="ctr"/>
+            <a:r>
+              <a:rPr lang="en-SG" altLang="zh-CN" dirty="0"/>
+              <a:t>{abstract}</a:t>
+            </a:r>
+          </a:p>
+          <a:p>
+            <a:pPr algn="ctr"/>
+            <a:r>
+              <a:rPr lang="en-SG" altLang="zh-CN" dirty="0"/>
+              <a:t>Command</a:t>
+            </a:r>
+            <a:endParaRPr lang="zh-CN" altLang="en-US" dirty="0"/>
+          </a:p>
+        </p:txBody>
+      </p:sp>
+      <p:sp>
+        <p:nvSpPr>
+          <p:cNvPr id="76" name="TextBox 75">
+            <a:extLst>
+              <a:ext uri="{FF2B5EF4-FFF2-40B4-BE49-F238E27FC236}">
+                <a16:creationId xmlns:a16="http://schemas.microsoft.com/office/drawing/2014/main" id="{A82B224A-6991-47A1-BFE3-3B0EC64C127C}"/>
+              </a:ext>
+            </a:extLst>
+          </p:cNvPr>
+          <p:cNvSpPr txBox="1"/>
+          <p:nvPr/>
+        </p:nvSpPr>
+        <p:spPr>
+          <a:xfrm>
+            <a:off x="2322991" y="1647132"/>
+            <a:ext cx="461665" cy="3029523"/>
+          </a:xfrm>
+          <a:prstGeom prst="rect">
+            <a:avLst/>
+          </a:prstGeom>
+        </p:spPr>
+        <p:style>
+          <a:lnRef idx="0">
+            <a:schemeClr val="accent1"/>
+          </a:lnRef>
+          <a:fillRef idx="3">
+            <a:schemeClr val="accent1"/>
+          </a:fillRef>
+          <a:effectRef idx="3">
+            <a:schemeClr val="accent1"/>
+          </a:effectRef>
+          <a:fontRef idx="minor">
+            <a:schemeClr val="lt1"/>
+          </a:fontRef>
+        </p:style>
+        <p:txBody>
+          <a:bodyPr vert="vert270" wrap="square" rtlCol="0">
+            <a:spAutoFit/>
+          </a:bodyPr>
+          <a:lstStyle/>
+          <a:p>
+            <a:pPr algn="ctr"/>
+            <a:r>
+              <a:rPr lang="en-SG" altLang="zh-CN" dirty="0" err="1"/>
+              <a:t>ParserManager</a:t>
+            </a:r>
+            <a:endParaRPr lang="en-SG" altLang="zh-CN" dirty="0"/>
+          </a:p>
+        </p:txBody>
+      </p:sp>
+      <p:sp>
+        <p:nvSpPr>
+          <p:cNvPr id="77" name="TextBox 76">
+            <a:extLst>
+              <a:ext uri="{FF2B5EF4-FFF2-40B4-BE49-F238E27FC236}">
+                <a16:creationId xmlns:a16="http://schemas.microsoft.com/office/drawing/2014/main" id="{84C983A5-D9BA-413F-B147-9C06E4D09F50}"/>
+              </a:ext>
+            </a:extLst>
+          </p:cNvPr>
+          <p:cNvSpPr txBox="1"/>
+          <p:nvPr/>
+        </p:nvSpPr>
+        <p:spPr>
+          <a:xfrm rot="5400000">
+            <a:off x="5162586" y="2054710"/>
+            <a:ext cx="461665" cy="2754167"/>
+          </a:xfrm>
+          <a:prstGeom prst="rect">
+            <a:avLst/>
+          </a:prstGeom>
+        </p:spPr>
+        <p:style>
+          <a:lnRef idx="0">
+            <a:schemeClr val="accent1"/>
+          </a:lnRef>
+          <a:fillRef idx="3">
+            <a:schemeClr val="accent1"/>
+          </a:fillRef>
+          <a:effectRef idx="3">
+            <a:schemeClr val="accent1"/>
+          </a:effectRef>
+          <a:fontRef idx="minor">
+            <a:schemeClr val="lt1"/>
+          </a:fontRef>
+        </p:style>
+        <p:txBody>
+          <a:bodyPr vert="vert270" wrap="square" rtlCol="0">
+            <a:spAutoFit/>
+          </a:bodyPr>
+          <a:lstStyle/>
+          <a:p>
+            <a:pPr algn="ctr"/>
+            <a:r>
+              <a:rPr lang="en-SG" altLang="zh-CN" dirty="0" err="1"/>
+              <a:t>XYZCommandParser</a:t>
+            </a:r>
+            <a:endParaRPr lang="zh-CN" altLang="en-US" dirty="0"/>
+          </a:p>
+        </p:txBody>
+      </p:sp>
+      <p:sp>
+        <p:nvSpPr>
+          <p:cNvPr id="78" name="TextBox 77">
+            <a:extLst>
+              <a:ext uri="{FF2B5EF4-FFF2-40B4-BE49-F238E27FC236}">
+                <a16:creationId xmlns:a16="http://schemas.microsoft.com/office/drawing/2014/main" id="{18FFE8FA-9E6B-47D9-A39E-C88B40E40F12}"/>
+              </a:ext>
+            </a:extLst>
+          </p:cNvPr>
+          <p:cNvSpPr txBox="1"/>
+          <p:nvPr/>
+        </p:nvSpPr>
+        <p:spPr>
+          <a:xfrm rot="5400000">
+            <a:off x="9031584" y="2036886"/>
+            <a:ext cx="461665" cy="2758211"/>
+          </a:xfrm>
+          <a:prstGeom prst="rect">
+            <a:avLst/>
+          </a:prstGeom>
+        </p:spPr>
+        <p:style>
+          <a:lnRef idx="0">
+            <a:schemeClr val="accent1"/>
+          </a:lnRef>
+          <a:fillRef idx="3">
+            <a:schemeClr val="accent1"/>
+          </a:fillRef>
+          <a:effectRef idx="3">
+            <a:schemeClr val="accent1"/>
+          </a:effectRef>
+          <a:fontRef idx="minor">
+            <a:schemeClr val="lt1"/>
+          </a:fontRef>
+        </p:style>
+        <p:txBody>
+          <a:bodyPr vert="vert270" wrap="square" rtlCol="0">
+            <a:spAutoFit/>
+          </a:bodyPr>
+          <a:lstStyle/>
+          <a:p>
+            <a:pPr algn="ctr"/>
+            <a:r>
+              <a:rPr lang="en-SG" altLang="zh-CN" dirty="0" err="1"/>
+              <a:t>XYZCommand</a:t>
+            </a:r>
+            <a:endParaRPr lang="zh-CN" altLang="en-US" dirty="0"/>
+          </a:p>
+        </p:txBody>
+      </p:sp>
+      <p:cxnSp>
+        <p:nvCxnSpPr>
+          <p:cNvPr id="79" name="Straight Connector 78">
+            <a:extLst>
+              <a:ext uri="{FF2B5EF4-FFF2-40B4-BE49-F238E27FC236}">
+                <a16:creationId xmlns:a16="http://schemas.microsoft.com/office/drawing/2014/main" id="{F07CF001-19D5-4DB5-AF3A-4EBC482CA675}"/>
+              </a:ext>
+            </a:extLst>
+          </p:cNvPr>
+          <p:cNvCxnSpPr/>
+          <p:nvPr/>
+        </p:nvCxnSpPr>
+        <p:spPr>
+          <a:xfrm>
+            <a:off x="5320317" y="2427900"/>
+            <a:ext cx="0" cy="844691"/>
+          </a:xfrm>
+          <a:prstGeom prst="line">
+            <a:avLst/>
+          </a:prstGeom>
+          <a:ln w="28575">
+            <a:prstDash val="dash"/>
+          </a:ln>
+        </p:spPr>
+        <p:style>
+          <a:lnRef idx="1">
+            <a:schemeClr val="accent1"/>
+          </a:lnRef>
+          <a:fillRef idx="0">
+            <a:schemeClr val="accent1"/>
+          </a:fillRef>
+          <a:effectRef idx="0">
+            <a:schemeClr val="accent1"/>
+          </a:effectRef>
+          <a:fontRef idx="minor">
+            <a:schemeClr val="tx1"/>
+          </a:fontRef>
+        </p:style>
+      </p:cxnSp>
+      <p:sp>
+        <p:nvSpPr>
+          <p:cNvPr id="80" name="Isosceles Triangle 79">
+            <a:extLst>
+              <a:ext uri="{FF2B5EF4-FFF2-40B4-BE49-F238E27FC236}">
+                <a16:creationId xmlns:a16="http://schemas.microsoft.com/office/drawing/2014/main" id="{F632202B-FD32-48D0-A580-C133E00575E8}"/>
               </a:ext>
             </a:extLst>
           </p:cNvPr>
@@ -4054,14 +4282,14 @@
         </p:nvSpPr>
         <p:spPr>
           <a:xfrm>
-            <a:off x="1287780" y="6296025"/>
-            <a:ext cx="7332345" cy="437159"/>
-          </a:xfrm>
-          <a:prstGeom prst="roundRect">
+            <a:off x="5143428" y="2379774"/>
+            <a:ext cx="365757" cy="269508"/>
+          </a:xfrm>
+          <a:prstGeom prst="triangle">
             <a:avLst/>
           </a:prstGeom>
           <a:solidFill>
-            <a:schemeClr val="accent6">
+            <a:schemeClr val="accent1">
               <a:lumMod val="60000"/>
               <a:lumOff val="40000"/>
             </a:schemeClr>
@@ -4088,20 +4316,59 @@
           <a:lstStyle/>
           <a:p>
             <a:pPr algn="ctr"/>
-            <a:r>
-              <a:rPr lang="en-US" altLang="zh-CN" dirty="0"/>
-              <a:t>UI</a:t>
-            </a:r>
-            <a:endParaRPr lang="zh-CN" altLang="en-US" dirty="0"/>
-          </a:p>
-        </p:txBody>
-      </p:sp>
-      <p:sp>
-        <p:nvSpPr>
-          <p:cNvPr id="6" name="TextBox 5">
-            <a:extLst>
-              <a:ext uri="{FF2B5EF4-FFF2-40B4-BE49-F238E27FC236}">
-                <a16:creationId xmlns:a16="http://schemas.microsoft.com/office/drawing/2014/main" id="{854F54AA-E870-4584-B39B-8B3A3A22DFED}"/>
+            <a:endParaRPr lang="en-SG"/>
+          </a:p>
+        </p:txBody>
+      </p:sp>
+      <p:cxnSp>
+        <p:nvCxnSpPr>
+          <p:cNvPr id="102" name="Straight Arrow Connector 101">
+            <a:extLst>
+              <a:ext uri="{FF2B5EF4-FFF2-40B4-BE49-F238E27FC236}">
+                <a16:creationId xmlns:a16="http://schemas.microsoft.com/office/drawing/2014/main" id="{D5B8B343-B564-4696-A8B6-831FE08F79A2}"/>
+              </a:ext>
+            </a:extLst>
+          </p:cNvPr>
+          <p:cNvCxnSpPr>
+            <a:cxnSpLocks/>
+          </p:cNvCxnSpPr>
+          <p:nvPr/>
+        </p:nvCxnSpPr>
+        <p:spPr>
+          <a:xfrm flipH="1" flipV="1">
+            <a:off x="10801324" y="1435717"/>
+            <a:ext cx="52978" cy="3630973"/>
+          </a:xfrm>
+          <a:prstGeom prst="straightConnector1">
+            <a:avLst/>
+          </a:prstGeom>
+          <a:ln w="28575">
+            <a:prstDash val="sysDot"/>
+            <a:headEnd type="none" w="med" len="med"/>
+            <a:tailEnd type="arrow" w="med" len="med"/>
+          </a:ln>
+        </p:spPr>
+        <p:style>
+          <a:lnRef idx="1">
+            <a:schemeClr val="accent1"/>
+          </a:lnRef>
+          <a:fillRef idx="0">
+            <a:schemeClr val="accent1"/>
+          </a:fillRef>
+          <a:effectRef idx="0">
+            <a:schemeClr val="accent1"/>
+          </a:effectRef>
+          <a:fontRef idx="minor">
+            <a:schemeClr val="tx1"/>
+          </a:fontRef>
+        </p:style>
+      </p:cxnSp>
+      <p:sp>
+        <p:nvSpPr>
+          <p:cNvPr id="108" name="TextBox 107">
+            <a:extLst>
+              <a:ext uri="{FF2B5EF4-FFF2-40B4-BE49-F238E27FC236}">
+                <a16:creationId xmlns:a16="http://schemas.microsoft.com/office/drawing/2014/main" id="{786084DE-D08B-459A-A650-397ACF5498D8}"/>
               </a:ext>
             </a:extLst>
           </p:cNvPr>
@@ -4110,8 +4377,8 @@
         </p:nvSpPr>
         <p:spPr>
           <a:xfrm>
-            <a:off x="1609725" y="403344"/>
-            <a:ext cx="792479" cy="369332"/>
+            <a:off x="1935399" y="2972398"/>
+            <a:ext cx="375268" cy="369332"/>
           </a:xfrm>
           <a:prstGeom prst="rect">
             <a:avLst/>
@@ -4125,25 +4392,504 @@
           <a:lstStyle/>
           <a:p>
             <a:r>
-              <a:rPr lang="en-US" altLang="zh-CN" dirty="0">
+              <a:rPr lang="en-US" altLang="zh-CN" b="1" dirty="0">
                 <a:solidFill>
-                  <a:schemeClr val="bg1"/>
+                  <a:schemeClr val="accent1">
+                    <a:lumMod val="75000"/>
+                  </a:schemeClr>
                 </a:solidFill>
               </a:rPr>
-              <a:t>Logic</a:t>
-            </a:r>
-            <a:endParaRPr lang="zh-CN" altLang="en-US" dirty="0">
+              <a:t>1</a:t>
+            </a:r>
+            <a:endParaRPr lang="zh-CN" altLang="en-US" b="1" dirty="0">
               <a:solidFill>
-                <a:schemeClr val="bg1"/>
+                <a:schemeClr val="accent1">
+                  <a:lumMod val="75000"/>
+                </a:schemeClr>
               </a:solidFill>
             </a:endParaRPr>
           </a:p>
         </p:txBody>
       </p:sp>
+      <p:sp>
+        <p:nvSpPr>
+          <p:cNvPr id="109" name="TextBox 108">
+            <a:extLst>
+              <a:ext uri="{FF2B5EF4-FFF2-40B4-BE49-F238E27FC236}">
+                <a16:creationId xmlns:a16="http://schemas.microsoft.com/office/drawing/2014/main" id="{3571825F-18A0-427A-9D6E-5472D6D5F45F}"/>
+              </a:ext>
+            </a:extLst>
+          </p:cNvPr>
+          <p:cNvSpPr txBox="1"/>
+          <p:nvPr/>
+        </p:nvSpPr>
+        <p:spPr>
+          <a:xfrm>
+            <a:off x="6099794" y="5115000"/>
+            <a:ext cx="1337313" cy="369332"/>
+          </a:xfrm>
+          <a:prstGeom prst="rect">
+            <a:avLst/>
+          </a:prstGeom>
+          <a:noFill/>
+        </p:spPr>
+        <p:txBody>
+          <a:bodyPr wrap="square" rtlCol="0">
+            <a:spAutoFit/>
+          </a:bodyPr>
+          <a:lstStyle/>
+          <a:p>
+            <a:r>
+              <a:rPr lang="en-US" altLang="zh-CN" b="1" dirty="0">
+                <a:solidFill>
+                  <a:schemeClr val="accent1">
+                    <a:lumMod val="75000"/>
+                  </a:schemeClr>
+                </a:solidFill>
+              </a:rPr>
+              <a:t>executes</a:t>
+            </a:r>
+            <a:endParaRPr lang="zh-CN" altLang="en-US" b="1" dirty="0">
+              <a:solidFill>
+                <a:schemeClr val="accent1">
+                  <a:lumMod val="75000"/>
+                </a:schemeClr>
+              </a:solidFill>
+            </a:endParaRPr>
+          </a:p>
+        </p:txBody>
+      </p:sp>
+      <p:sp>
+        <p:nvSpPr>
+          <p:cNvPr id="111" name="TextBox 110">
+            <a:extLst>
+              <a:ext uri="{FF2B5EF4-FFF2-40B4-BE49-F238E27FC236}">
+                <a16:creationId xmlns:a16="http://schemas.microsoft.com/office/drawing/2014/main" id="{8EDA6960-69A3-4AD6-B591-4B5DAAA0E00E}"/>
+              </a:ext>
+            </a:extLst>
+          </p:cNvPr>
+          <p:cNvSpPr txBox="1"/>
+          <p:nvPr/>
+        </p:nvSpPr>
+        <p:spPr>
+          <a:xfrm>
+            <a:off x="2911971" y="3352936"/>
+            <a:ext cx="992082" cy="369332"/>
+          </a:xfrm>
+          <a:prstGeom prst="rect">
+            <a:avLst/>
+          </a:prstGeom>
+          <a:noFill/>
+        </p:spPr>
+        <p:txBody>
+          <a:bodyPr wrap="square" rtlCol="0">
+            <a:spAutoFit/>
+          </a:bodyPr>
+          <a:lstStyle/>
+          <a:p>
+            <a:r>
+              <a:rPr lang="en-US" altLang="zh-CN" b="1" dirty="0">
+                <a:solidFill>
+                  <a:schemeClr val="accent1">
+                    <a:lumMod val="75000"/>
+                  </a:schemeClr>
+                </a:solidFill>
+              </a:rPr>
+              <a:t>creates</a:t>
+            </a:r>
+            <a:endParaRPr lang="zh-CN" altLang="en-US" b="1" dirty="0">
+              <a:solidFill>
+                <a:schemeClr val="accent1">
+                  <a:lumMod val="75000"/>
+                </a:schemeClr>
+              </a:solidFill>
+            </a:endParaRPr>
+          </a:p>
+        </p:txBody>
+      </p:sp>
+      <p:sp>
+        <p:nvSpPr>
+          <p:cNvPr id="113" name="TextBox 112">
+            <a:extLst>
+              <a:ext uri="{FF2B5EF4-FFF2-40B4-BE49-F238E27FC236}">
+                <a16:creationId xmlns:a16="http://schemas.microsoft.com/office/drawing/2014/main" id="{A9824DAC-702B-441A-8565-3617994EDDEC}"/>
+              </a:ext>
+            </a:extLst>
+          </p:cNvPr>
+          <p:cNvSpPr txBox="1"/>
+          <p:nvPr/>
+        </p:nvSpPr>
+        <p:spPr>
+          <a:xfrm>
+            <a:off x="9655443" y="1805917"/>
+            <a:ext cx="1337313" cy="369332"/>
+          </a:xfrm>
+          <a:prstGeom prst="rect">
+            <a:avLst/>
+          </a:prstGeom>
+          <a:noFill/>
+        </p:spPr>
+        <p:txBody>
+          <a:bodyPr wrap="square" rtlCol="0">
+            <a:spAutoFit/>
+          </a:bodyPr>
+          <a:lstStyle/>
+          <a:p>
+            <a:r>
+              <a:rPr lang="en-US" altLang="zh-CN" b="1" dirty="0">
+                <a:solidFill>
+                  <a:schemeClr val="accent1">
+                    <a:lumMod val="75000"/>
+                  </a:schemeClr>
+                </a:solidFill>
+              </a:rPr>
+              <a:t>produces</a:t>
+            </a:r>
+            <a:endParaRPr lang="zh-CN" altLang="en-US" b="1" dirty="0">
+              <a:solidFill>
+                <a:schemeClr val="accent1">
+                  <a:lumMod val="75000"/>
+                </a:schemeClr>
+              </a:solidFill>
+            </a:endParaRPr>
+          </a:p>
+        </p:txBody>
+      </p:sp>
+      <p:sp>
+        <p:nvSpPr>
+          <p:cNvPr id="114" name="Isosceles Triangle 113">
+            <a:extLst>
+              <a:ext uri="{FF2B5EF4-FFF2-40B4-BE49-F238E27FC236}">
+                <a16:creationId xmlns:a16="http://schemas.microsoft.com/office/drawing/2014/main" id="{8F31183D-570A-4FF2-8C69-7B10957EF040}"/>
+              </a:ext>
+            </a:extLst>
+          </p:cNvPr>
+          <p:cNvSpPr/>
+          <p:nvPr/>
+        </p:nvSpPr>
+        <p:spPr>
+          <a:xfrm rot="5400000">
+            <a:off x="3776568" y="3487661"/>
+            <a:ext cx="155565" cy="152371"/>
+          </a:xfrm>
+          <a:prstGeom prst="triangle">
+            <a:avLst/>
+          </a:prstGeom>
+          <a:solidFill>
+            <a:schemeClr val="tx2"/>
+          </a:solidFill>
+        </p:spPr>
+        <p:style>
+          <a:lnRef idx="2">
+            <a:schemeClr val="accent1">
+              <a:shade val="50000"/>
+            </a:schemeClr>
+          </a:lnRef>
+          <a:fillRef idx="1">
+            <a:schemeClr val="accent1"/>
+          </a:fillRef>
+          <a:effectRef idx="0">
+            <a:schemeClr val="accent1"/>
+          </a:effectRef>
+          <a:fontRef idx="minor">
+            <a:schemeClr val="lt1"/>
+          </a:fontRef>
+        </p:style>
+        <p:txBody>
+          <a:bodyPr rtlCol="0" anchor="ctr"/>
+          <a:lstStyle/>
+          <a:p>
+            <a:pPr algn="ctr"/>
+            <a:endParaRPr lang="en-SG"/>
+          </a:p>
+        </p:txBody>
+      </p:sp>
+      <p:sp>
+        <p:nvSpPr>
+          <p:cNvPr id="115" name="Isosceles Triangle 114">
+            <a:extLst>
+              <a:ext uri="{FF2B5EF4-FFF2-40B4-BE49-F238E27FC236}">
+                <a16:creationId xmlns:a16="http://schemas.microsoft.com/office/drawing/2014/main" id="{C3ACE1A1-9150-4841-8E53-16F516FCA437}"/>
+              </a:ext>
+            </a:extLst>
+          </p:cNvPr>
+          <p:cNvSpPr/>
+          <p:nvPr/>
+        </p:nvSpPr>
+        <p:spPr>
+          <a:xfrm rot="5400000">
+            <a:off x="7143006" y="5229231"/>
+            <a:ext cx="155565" cy="152371"/>
+          </a:xfrm>
+          <a:prstGeom prst="triangle">
+            <a:avLst/>
+          </a:prstGeom>
+          <a:solidFill>
+            <a:schemeClr val="tx2"/>
+          </a:solidFill>
+        </p:spPr>
+        <p:style>
+          <a:lnRef idx="2">
+            <a:schemeClr val="accent1">
+              <a:shade val="50000"/>
+            </a:schemeClr>
+          </a:lnRef>
+          <a:fillRef idx="1">
+            <a:schemeClr val="accent1"/>
+          </a:fillRef>
+          <a:effectRef idx="0">
+            <a:schemeClr val="accent1"/>
+          </a:effectRef>
+          <a:fontRef idx="minor">
+            <a:schemeClr val="lt1"/>
+          </a:fontRef>
+        </p:style>
+        <p:txBody>
+          <a:bodyPr rtlCol="0" anchor="ctr"/>
+          <a:lstStyle/>
+          <a:p>
+            <a:pPr algn="ctr"/>
+            <a:endParaRPr lang="en-SG"/>
+          </a:p>
+        </p:txBody>
+      </p:sp>
+      <p:sp>
+        <p:nvSpPr>
+          <p:cNvPr id="116" name="Isosceles Triangle 115">
+            <a:extLst>
+              <a:ext uri="{FF2B5EF4-FFF2-40B4-BE49-F238E27FC236}">
+                <a16:creationId xmlns:a16="http://schemas.microsoft.com/office/drawing/2014/main" id="{8FCB8D2D-83EF-4A27-92B1-9C963BBD930A}"/>
+              </a:ext>
+            </a:extLst>
+          </p:cNvPr>
+          <p:cNvSpPr/>
+          <p:nvPr/>
+        </p:nvSpPr>
+        <p:spPr>
+          <a:xfrm>
+            <a:off x="10412757" y="1628222"/>
+            <a:ext cx="155565" cy="152371"/>
+          </a:xfrm>
+          <a:prstGeom prst="triangle">
+            <a:avLst/>
+          </a:prstGeom>
+          <a:solidFill>
+            <a:schemeClr val="tx2"/>
+          </a:solidFill>
+        </p:spPr>
+        <p:style>
+          <a:lnRef idx="2">
+            <a:schemeClr val="accent1">
+              <a:shade val="50000"/>
+            </a:schemeClr>
+          </a:lnRef>
+          <a:fillRef idx="1">
+            <a:schemeClr val="accent1"/>
+          </a:fillRef>
+          <a:effectRef idx="0">
+            <a:schemeClr val="accent1"/>
+          </a:effectRef>
+          <a:fontRef idx="minor">
+            <a:schemeClr val="lt1"/>
+          </a:fontRef>
+        </p:style>
+        <p:txBody>
+          <a:bodyPr rtlCol="0" anchor="ctr"/>
+          <a:lstStyle/>
+          <a:p>
+            <a:pPr algn="ctr"/>
+            <a:endParaRPr lang="en-SG"/>
+          </a:p>
+        </p:txBody>
+      </p:sp>
+      <p:cxnSp>
+        <p:nvCxnSpPr>
+          <p:cNvPr id="117" name="Straight Arrow Connector 116">
+            <a:extLst>
+              <a:ext uri="{FF2B5EF4-FFF2-40B4-BE49-F238E27FC236}">
+                <a16:creationId xmlns:a16="http://schemas.microsoft.com/office/drawing/2014/main" id="{92224D99-43CA-4A9D-AD9C-E6C9EBA09C92}"/>
+              </a:ext>
+            </a:extLst>
+          </p:cNvPr>
+          <p:cNvCxnSpPr>
+            <a:cxnSpLocks/>
+            <a:endCxn id="78" idx="2"/>
+          </p:cNvCxnSpPr>
+          <p:nvPr/>
+        </p:nvCxnSpPr>
+        <p:spPr>
+          <a:xfrm>
+            <a:off x="6775871" y="3415992"/>
+            <a:ext cx="1107440" cy="0"/>
+          </a:xfrm>
+          <a:prstGeom prst="straightConnector1">
+            <a:avLst/>
+          </a:prstGeom>
+          <a:ln w="28575">
+            <a:prstDash val="sysDot"/>
+            <a:headEnd type="none" w="med" len="med"/>
+            <a:tailEnd type="arrow" w="med" len="med"/>
+          </a:ln>
+        </p:spPr>
+        <p:style>
+          <a:lnRef idx="1">
+            <a:schemeClr val="accent1"/>
+          </a:lnRef>
+          <a:fillRef idx="0">
+            <a:schemeClr val="accent1"/>
+          </a:fillRef>
+          <a:effectRef idx="0">
+            <a:schemeClr val="accent1"/>
+          </a:effectRef>
+          <a:fontRef idx="minor">
+            <a:schemeClr val="tx1"/>
+          </a:fontRef>
+        </p:style>
+      </p:cxnSp>
+      <p:sp>
+        <p:nvSpPr>
+          <p:cNvPr id="124" name="TextBox 123">
+            <a:extLst>
+              <a:ext uri="{FF2B5EF4-FFF2-40B4-BE49-F238E27FC236}">
+                <a16:creationId xmlns:a16="http://schemas.microsoft.com/office/drawing/2014/main" id="{B08E1C0E-391E-46B7-AC91-FD22AF8C0943}"/>
+              </a:ext>
+            </a:extLst>
+          </p:cNvPr>
+          <p:cNvSpPr txBox="1"/>
+          <p:nvPr/>
+        </p:nvSpPr>
+        <p:spPr>
+          <a:xfrm>
+            <a:off x="6742638" y="3361019"/>
+            <a:ext cx="1192237" cy="369332"/>
+          </a:xfrm>
+          <a:prstGeom prst="rect">
+            <a:avLst/>
+          </a:prstGeom>
+          <a:noFill/>
+        </p:spPr>
+        <p:txBody>
+          <a:bodyPr wrap="square" rtlCol="0">
+            <a:spAutoFit/>
+          </a:bodyPr>
+          <a:lstStyle/>
+          <a:p>
+            <a:r>
+              <a:rPr lang="en-US" altLang="zh-CN" b="1" dirty="0">
+                <a:solidFill>
+                  <a:schemeClr val="accent1">
+                    <a:lumMod val="75000"/>
+                  </a:schemeClr>
+                </a:solidFill>
+              </a:rPr>
+              <a:t>creates</a:t>
+            </a:r>
+            <a:endParaRPr lang="zh-CN" altLang="en-US" b="1" dirty="0">
+              <a:solidFill>
+                <a:schemeClr val="accent1">
+                  <a:lumMod val="75000"/>
+                </a:schemeClr>
+              </a:solidFill>
+            </a:endParaRPr>
+          </a:p>
+        </p:txBody>
+      </p:sp>
+      <p:sp>
+        <p:nvSpPr>
+          <p:cNvPr id="125" name="Isosceles Triangle 124">
+            <a:extLst>
+              <a:ext uri="{FF2B5EF4-FFF2-40B4-BE49-F238E27FC236}">
+                <a16:creationId xmlns:a16="http://schemas.microsoft.com/office/drawing/2014/main" id="{92673013-D38B-48AD-ABE9-1AB3032A893C}"/>
+              </a:ext>
+            </a:extLst>
+          </p:cNvPr>
+          <p:cNvSpPr/>
+          <p:nvPr/>
+        </p:nvSpPr>
+        <p:spPr>
+          <a:xfrm rot="5400000">
+            <a:off x="7640774" y="3475250"/>
+            <a:ext cx="155565" cy="152371"/>
+          </a:xfrm>
+          <a:prstGeom prst="triangle">
+            <a:avLst/>
+          </a:prstGeom>
+          <a:solidFill>
+            <a:schemeClr val="tx2"/>
+          </a:solidFill>
+        </p:spPr>
+        <p:style>
+          <a:lnRef idx="2">
+            <a:schemeClr val="accent1">
+              <a:shade val="50000"/>
+            </a:schemeClr>
+          </a:lnRef>
+          <a:fillRef idx="1">
+            <a:schemeClr val="accent1"/>
+          </a:fillRef>
+          <a:effectRef idx="0">
+            <a:schemeClr val="accent1"/>
+          </a:effectRef>
+          <a:fontRef idx="minor">
+            <a:schemeClr val="lt1"/>
+          </a:fontRef>
+        </p:style>
+        <p:txBody>
+          <a:bodyPr rtlCol="0" anchor="ctr"/>
+          <a:lstStyle/>
+          <a:p>
+            <a:pPr algn="ctr"/>
+            <a:endParaRPr lang="en-SG"/>
+          </a:p>
+        </p:txBody>
+      </p:sp>
+      <p:cxnSp>
+        <p:nvCxnSpPr>
+          <p:cNvPr id="126" name="Straight Arrow Connector 125">
+            <a:extLst>
+              <a:ext uri="{FF2B5EF4-FFF2-40B4-BE49-F238E27FC236}">
+                <a16:creationId xmlns:a16="http://schemas.microsoft.com/office/drawing/2014/main" id="{667E11DF-D3C3-4D6A-BF42-46AB373FDA49}"/>
+              </a:ext>
+            </a:extLst>
+          </p:cNvPr>
+          <p:cNvCxnSpPr>
+            <a:cxnSpLocks/>
+          </p:cNvCxnSpPr>
+          <p:nvPr/>
+        </p:nvCxnSpPr>
+        <p:spPr>
+          <a:xfrm>
+            <a:off x="10135402" y="5402964"/>
+            <a:ext cx="0" cy="475131"/>
+          </a:xfrm>
+          <a:prstGeom prst="straightConnector1">
+            <a:avLst/>
+          </a:prstGeom>
+          <a:ln w="28575">
+            <a:prstDash val="sysDot"/>
+            <a:headEnd type="none" w="med" len="med"/>
+            <a:tailEnd type="arrow" w="med" len="med"/>
+          </a:ln>
+        </p:spPr>
+        <p:style>
+          <a:lnRef idx="1">
+            <a:schemeClr val="accent1"/>
+          </a:lnRef>
+          <a:fillRef idx="0">
+            <a:schemeClr val="accent1"/>
+          </a:fillRef>
+          <a:effectRef idx="0">
+            <a:schemeClr val="accent1"/>
+          </a:effectRef>
+          <a:fontRef idx="minor">
+            <a:schemeClr val="tx1"/>
+          </a:fontRef>
+        </p:style>
+      </p:cxnSp>
     </p:spTree>
     <p:extLst>
       <p:ext uri="{BB962C8B-B14F-4D97-AF65-F5344CB8AC3E}">
-        <p14:creationId xmlns:p14="http://schemas.microsoft.com/office/powerpoint/2010/main" val="3999654014"/>
+        <p14:creationId xmlns:p14="http://schemas.microsoft.com/office/powerpoint/2010/main" val="1532487138"/>
       </p:ext>
     </p:extLst>
   </p:cSld>

</xml_diff>

<commit_message>
Made new diagrams for Logic Component, for DG
</commit_message>
<xml_diff>
--- a/docs/diagrams/LogicClassDiagram.pptx
+++ b/docs/diagrams/LogicClassDiagram.pptx
@@ -261,7 +261,7 @@
           <a:p>
             <a:fld id="{2234AB4E-EA5F-4C87-94B4-611343EDF8A2}" type="datetimeFigureOut">
               <a:rPr lang="zh-CN" altLang="en-US" smtClean="0"/>
-              <a:t>2019/10/25</a:t>
+              <a:t>2019/11/3</a:t>
             </a:fld>
             <a:endParaRPr lang="zh-CN" altLang="en-US"/>
           </a:p>
@@ -461,7 +461,7 @@
           <a:p>
             <a:fld id="{2234AB4E-EA5F-4C87-94B4-611343EDF8A2}" type="datetimeFigureOut">
               <a:rPr lang="zh-CN" altLang="en-US" smtClean="0"/>
-              <a:t>2019/10/25</a:t>
+              <a:t>2019/11/3</a:t>
             </a:fld>
             <a:endParaRPr lang="zh-CN" altLang="en-US"/>
           </a:p>
@@ -671,7 +671,7 @@
           <a:p>
             <a:fld id="{2234AB4E-EA5F-4C87-94B4-611343EDF8A2}" type="datetimeFigureOut">
               <a:rPr lang="zh-CN" altLang="en-US" smtClean="0"/>
-              <a:t>2019/10/25</a:t>
+              <a:t>2019/11/3</a:t>
             </a:fld>
             <a:endParaRPr lang="zh-CN" altLang="en-US"/>
           </a:p>
@@ -871,7 +871,7 @@
           <a:p>
             <a:fld id="{2234AB4E-EA5F-4C87-94B4-611343EDF8A2}" type="datetimeFigureOut">
               <a:rPr lang="zh-CN" altLang="en-US" smtClean="0"/>
-              <a:t>2019/10/25</a:t>
+              <a:t>2019/11/3</a:t>
             </a:fld>
             <a:endParaRPr lang="zh-CN" altLang="en-US"/>
           </a:p>
@@ -1147,7 +1147,7 @@
           <a:p>
             <a:fld id="{2234AB4E-EA5F-4C87-94B4-611343EDF8A2}" type="datetimeFigureOut">
               <a:rPr lang="zh-CN" altLang="en-US" smtClean="0"/>
-              <a:t>2019/10/25</a:t>
+              <a:t>2019/11/3</a:t>
             </a:fld>
             <a:endParaRPr lang="zh-CN" altLang="en-US"/>
           </a:p>
@@ -1415,7 +1415,7 @@
           <a:p>
             <a:fld id="{2234AB4E-EA5F-4C87-94B4-611343EDF8A2}" type="datetimeFigureOut">
               <a:rPr lang="zh-CN" altLang="en-US" smtClean="0"/>
-              <a:t>2019/10/25</a:t>
+              <a:t>2019/11/3</a:t>
             </a:fld>
             <a:endParaRPr lang="zh-CN" altLang="en-US"/>
           </a:p>
@@ -1830,7 +1830,7 @@
           <a:p>
             <a:fld id="{2234AB4E-EA5F-4C87-94B4-611343EDF8A2}" type="datetimeFigureOut">
               <a:rPr lang="zh-CN" altLang="en-US" smtClean="0"/>
-              <a:t>2019/10/25</a:t>
+              <a:t>2019/11/3</a:t>
             </a:fld>
             <a:endParaRPr lang="zh-CN" altLang="en-US"/>
           </a:p>
@@ -1972,7 +1972,7 @@
           <a:p>
             <a:fld id="{2234AB4E-EA5F-4C87-94B4-611343EDF8A2}" type="datetimeFigureOut">
               <a:rPr lang="zh-CN" altLang="en-US" smtClean="0"/>
-              <a:t>2019/10/25</a:t>
+              <a:t>2019/11/3</a:t>
             </a:fld>
             <a:endParaRPr lang="zh-CN" altLang="en-US"/>
           </a:p>
@@ -2085,7 +2085,7 @@
           <a:p>
             <a:fld id="{2234AB4E-EA5F-4C87-94B4-611343EDF8A2}" type="datetimeFigureOut">
               <a:rPr lang="zh-CN" altLang="en-US" smtClean="0"/>
-              <a:t>2019/10/25</a:t>
+              <a:t>2019/11/3</a:t>
             </a:fld>
             <a:endParaRPr lang="zh-CN" altLang="en-US"/>
           </a:p>
@@ -2398,7 +2398,7 @@
           <a:p>
             <a:fld id="{2234AB4E-EA5F-4C87-94B4-611343EDF8A2}" type="datetimeFigureOut">
               <a:rPr lang="zh-CN" altLang="en-US" smtClean="0"/>
-              <a:t>2019/10/25</a:t>
+              <a:t>2019/11/3</a:t>
             </a:fld>
             <a:endParaRPr lang="zh-CN" altLang="en-US"/>
           </a:p>
@@ -2687,7 +2687,7 @@
           <a:p>
             <a:fld id="{2234AB4E-EA5F-4C87-94B4-611343EDF8A2}" type="datetimeFigureOut">
               <a:rPr lang="zh-CN" altLang="en-US" smtClean="0"/>
-              <a:t>2019/10/25</a:t>
+              <a:t>2019/11/3</a:t>
             </a:fld>
             <a:endParaRPr lang="zh-CN" altLang="en-US"/>
           </a:p>
@@ -2930,7 +2930,7 @@
           <a:p>
             <a:fld id="{2234AB4E-EA5F-4C87-94B4-611343EDF8A2}" type="datetimeFigureOut">
               <a:rPr lang="zh-CN" altLang="en-US" smtClean="0"/>
-              <a:t>2019/10/25</a:t>
+              <a:t>2019/11/3</a:t>
             </a:fld>
             <a:endParaRPr lang="zh-CN" altLang="en-US"/>
           </a:p>
@@ -3361,8 +3361,8 @@
         </p:nvSpPr>
         <p:spPr>
           <a:xfrm>
-            <a:off x="442762" y="108510"/>
-            <a:ext cx="11213432" cy="5602532"/>
+            <a:off x="537409" y="144378"/>
+            <a:ext cx="11213432" cy="4628743"/>
           </a:xfrm>
           <a:prstGeom prst="roundRect">
             <a:avLst/>
@@ -3464,9 +3464,9 @@
           <p:nvPr/>
         </p:nvSpPr>
         <p:spPr>
-          <a:xfrm>
-            <a:off x="1114666" y="779646"/>
-            <a:ext cx="461665" cy="4764497"/>
+          <a:xfrm rot="5400000">
+            <a:off x="1738333" y="2432833"/>
+            <a:ext cx="461665" cy="2162670"/>
           </a:xfrm>
           <a:prstGeom prst="rect">
             <a:avLst/>
@@ -3514,8 +3514,8 @@
         </p:nvSpPr>
         <p:spPr>
           <a:xfrm rot="5400000">
-            <a:off x="8985200" y="-719166"/>
-            <a:ext cx="461665" cy="3848100"/>
+            <a:off x="5047280" y="3111206"/>
+            <a:ext cx="461665" cy="2031101"/>
           </a:xfrm>
           <a:prstGeom prst="rect">
             <a:avLst/>
@@ -3560,13 +3560,14 @@
           </p:cNvPr>
           <p:cNvCxnSpPr>
             <a:cxnSpLocks/>
+            <a:stCxn id="6" idx="1"/>
           </p:cNvCxnSpPr>
           <p:nvPr/>
         </p:nvCxnSpPr>
         <p:spPr>
-          <a:xfrm>
-            <a:off x="1594702" y="2956275"/>
-            <a:ext cx="696111" cy="0"/>
+          <a:xfrm flipV="1">
+            <a:off x="1969166" y="2333163"/>
+            <a:ext cx="0" cy="950173"/>
           </a:xfrm>
           <a:prstGeom prst="straightConnector1">
             <a:avLst/>
@@ -3605,7 +3606,7 @@
         </p:nvSpPr>
         <p:spPr>
           <a:xfrm>
-            <a:off x="442762" y="5878095"/>
+            <a:off x="538977" y="4916367"/>
             <a:ext cx="11213432" cy="770929"/>
           </a:xfrm>
           <a:prstGeom prst="roundRect">
@@ -3666,14 +3667,13 @@
           </p:cNvPr>
           <p:cNvCxnSpPr>
             <a:cxnSpLocks/>
-            <a:stCxn id="6" idx="2"/>
           </p:cNvCxnSpPr>
           <p:nvPr/>
         </p:nvCxnSpPr>
         <p:spPr>
           <a:xfrm>
-            <a:off x="1345499" y="5544143"/>
-            <a:ext cx="0" cy="404817"/>
+            <a:off x="2248375" y="3732376"/>
+            <a:ext cx="0" cy="1183991"/>
           </a:xfrm>
           <a:prstGeom prst="straightConnector1">
             <a:avLst/>
@@ -3709,13 +3709,14 @@
           </p:cNvPr>
           <p:cNvCxnSpPr>
             <a:cxnSpLocks/>
+            <a:stCxn id="67" idx="0"/>
           </p:cNvCxnSpPr>
           <p:nvPr/>
         </p:nvCxnSpPr>
         <p:spPr>
-          <a:xfrm>
-            <a:off x="1576331" y="1227309"/>
-            <a:ext cx="5715651" cy="20128"/>
+          <a:xfrm flipV="1">
+            <a:off x="6874290" y="2068084"/>
+            <a:ext cx="1145881" cy="4426"/>
           </a:xfrm>
           <a:prstGeom prst="straightConnector1">
             <a:avLst/>
@@ -3757,7 +3758,7 @@
         </p:nvCxnSpPr>
         <p:spPr>
           <a:xfrm>
-            <a:off x="9070360" y="3661759"/>
+            <a:off x="8887482" y="2299034"/>
             <a:ext cx="0" cy="844691"/>
           </a:xfrm>
           <a:prstGeom prst="line">
@@ -3796,7 +3797,7 @@
         </p:nvSpPr>
         <p:spPr>
           <a:xfrm rot="10800000">
-            <a:off x="8887482" y="4374354"/>
+            <a:off x="8704603" y="2895371"/>
             <a:ext cx="365757" cy="269508"/>
           </a:xfrm>
           <a:prstGeom prst="triangle">
@@ -3836,67 +3837,24 @@
       </p:sp>
       <p:cxnSp>
         <p:nvCxnSpPr>
-          <p:cNvPr id="71" name="Straight Arrow Connector 70">
-            <a:extLst>
-              <a:ext uri="{FF2B5EF4-FFF2-40B4-BE49-F238E27FC236}">
-                <a16:creationId xmlns:a16="http://schemas.microsoft.com/office/drawing/2014/main" id="{181133DA-BA47-42E5-8787-53055E7C51D1}"/>
+          <p:cNvPr id="72" name="Straight Arrow Connector 71">
+            <a:extLst>
+              <a:ext uri="{FF2B5EF4-FFF2-40B4-BE49-F238E27FC236}">
+                <a16:creationId xmlns:a16="http://schemas.microsoft.com/office/drawing/2014/main" id="{D2DA600E-0E07-4D0C-8B20-B67B8D3ECF1D}"/>
               </a:ext>
             </a:extLst>
           </p:cNvPr>
           <p:cNvCxnSpPr>
             <a:cxnSpLocks/>
-            <a:endCxn id="77" idx="2"/>
-          </p:cNvCxnSpPr>
-          <p:nvPr/>
-        </p:nvCxnSpPr>
-        <p:spPr>
-          <a:xfrm>
-            <a:off x="2715487" y="3430926"/>
-            <a:ext cx="1300848" cy="868"/>
-          </a:xfrm>
-          <a:prstGeom prst="straightConnector1">
-            <a:avLst/>
-          </a:prstGeom>
-          <a:ln w="28575">
-            <a:prstDash val="sysDot"/>
-            <a:headEnd type="none" w="med" len="med"/>
-            <a:tailEnd type="arrow" w="med" len="med"/>
-          </a:ln>
-        </p:spPr>
-        <p:style>
-          <a:lnRef idx="1">
-            <a:schemeClr val="accent1"/>
-          </a:lnRef>
-          <a:fillRef idx="0">
-            <a:schemeClr val="accent1"/>
-          </a:fillRef>
-          <a:effectRef idx="0">
-            <a:schemeClr val="accent1"/>
-          </a:effectRef>
-          <a:fontRef idx="minor">
-            <a:schemeClr val="tx1"/>
-          </a:fontRef>
-        </p:style>
-      </p:cxnSp>
-      <p:cxnSp>
-        <p:nvCxnSpPr>
-          <p:cNvPr id="72" name="Straight Arrow Connector 71">
-            <a:extLst>
-              <a:ext uri="{FF2B5EF4-FFF2-40B4-BE49-F238E27FC236}">
-                <a16:creationId xmlns:a16="http://schemas.microsoft.com/office/drawing/2014/main" id="{D2DA600E-0E07-4D0C-8B20-B67B8D3ECF1D}"/>
-              </a:ext>
-            </a:extLst>
-          </p:cNvPr>
-          <p:cNvCxnSpPr>
-            <a:cxnSpLocks/>
+            <a:stCxn id="6" idx="0"/>
             <a:endCxn id="75" idx="2"/>
           </p:cNvCxnSpPr>
           <p:nvPr/>
         </p:nvCxnSpPr>
         <p:spPr>
           <a:xfrm>
-            <a:off x="1643643" y="5018098"/>
-            <a:ext cx="5895980" cy="1"/>
+            <a:off x="3050501" y="3514169"/>
+            <a:ext cx="5097285" cy="10875"/>
           </a:xfrm>
           <a:prstGeom prst="straightConnector1">
             <a:avLst/>
@@ -3937,9 +3895,9 @@
           <p:nvPr/>
         </p:nvCxnSpPr>
         <p:spPr>
-          <a:xfrm>
-            <a:off x="10552196" y="5066690"/>
-            <a:ext cx="302106" cy="0"/>
+          <a:xfrm flipV="1">
+            <a:off x="8460606" y="3924838"/>
+            <a:ext cx="0" cy="229878"/>
           </a:xfrm>
           <a:prstGeom prst="line">
             <a:avLst/>
@@ -3965,10 +3923,10 @@
       </p:cxnSp>
       <p:sp>
         <p:nvSpPr>
-          <p:cNvPr id="74" name="TextBox 73">
-            <a:extLst>
-              <a:ext uri="{FF2B5EF4-FFF2-40B4-BE49-F238E27FC236}">
-                <a16:creationId xmlns:a16="http://schemas.microsoft.com/office/drawing/2014/main" id="{C8985E7A-77FC-4B06-9C83-9071021B97DD}"/>
+          <p:cNvPr id="75" name="TextBox 74">
+            <a:extLst>
+              <a:ext uri="{FF2B5EF4-FFF2-40B4-BE49-F238E27FC236}">
+                <a16:creationId xmlns:a16="http://schemas.microsoft.com/office/drawing/2014/main" id="{4BF59EDD-9118-4385-A61F-4683D5AB8117}"/>
               </a:ext>
             </a:extLst>
           </p:cNvPr>
@@ -3977,8 +3935,8 @@
         </p:nvSpPr>
         <p:spPr>
           <a:xfrm rot="5400000">
-            <a:off x="5022034" y="660781"/>
-            <a:ext cx="738664" cy="2754168"/>
+            <a:off x="8501238" y="2802259"/>
+            <a:ext cx="738664" cy="1445569"/>
           </a:xfrm>
           <a:prstGeom prst="rect">
             <a:avLst/>
@@ -4007,63 +3965,6 @@
             <a:pPr algn="ctr"/>
             <a:r>
               <a:rPr lang="en-SG" altLang="zh-CN" dirty="0"/>
-              <a:t>&lt;&lt;interface&gt;&gt;</a:t>
-            </a:r>
-          </a:p>
-          <a:p>
-            <a:pPr algn="ctr"/>
-            <a:r>
-              <a:rPr lang="en-SG" altLang="zh-CN" dirty="0"/>
-              <a:t>CommandParser</a:t>
-            </a:r>
-            <a:endParaRPr lang="zh-CN" altLang="en-US" dirty="0"/>
-          </a:p>
-        </p:txBody>
-      </p:sp>
-      <p:sp>
-        <p:nvSpPr>
-          <p:cNvPr id="75" name="TextBox 74">
-            <a:extLst>
-              <a:ext uri="{FF2B5EF4-FFF2-40B4-BE49-F238E27FC236}">
-                <a16:creationId xmlns:a16="http://schemas.microsoft.com/office/drawing/2014/main" id="{4BF59EDD-9118-4385-A61F-4683D5AB8117}"/>
-              </a:ext>
-            </a:extLst>
-          </p:cNvPr>
-          <p:cNvSpPr txBox="1"/>
-          <p:nvPr/>
-        </p:nvSpPr>
-        <p:spPr>
-          <a:xfrm rot="5400000">
-            <a:off x="8721918" y="3466471"/>
-            <a:ext cx="738664" cy="3103255"/>
-          </a:xfrm>
-          <a:prstGeom prst="rect">
-            <a:avLst/>
-          </a:prstGeom>
-        </p:spPr>
-        <p:style>
-          <a:lnRef idx="0">
-            <a:schemeClr val="accent1"/>
-          </a:lnRef>
-          <a:fillRef idx="3">
-            <a:schemeClr val="accent1"/>
-          </a:fillRef>
-          <a:effectRef idx="3">
-            <a:schemeClr val="accent1"/>
-          </a:effectRef>
-          <a:fontRef idx="minor">
-            <a:schemeClr val="lt1"/>
-          </a:fontRef>
-        </p:style>
-        <p:txBody>
-          <a:bodyPr vert="vert270" wrap="square" rtlCol="0">
-            <a:spAutoFit/>
-          </a:bodyPr>
-          <a:lstStyle/>
-          <a:p>
-            <a:pPr algn="ctr"/>
-            <a:r>
-              <a:rPr lang="en-SG" altLang="zh-CN" dirty="0"/>
               <a:t>{abstract}</a:t>
             </a:r>
           </a:p>
@@ -4072,155 +3973,6 @@
             <a:r>
               <a:rPr lang="en-SG" altLang="zh-CN" dirty="0"/>
               <a:t>Command</a:t>
-            </a:r>
-            <a:endParaRPr lang="zh-CN" altLang="en-US" dirty="0"/>
-          </a:p>
-        </p:txBody>
-      </p:sp>
-      <p:sp>
-        <p:nvSpPr>
-          <p:cNvPr id="76" name="TextBox 75">
-            <a:extLst>
-              <a:ext uri="{FF2B5EF4-FFF2-40B4-BE49-F238E27FC236}">
-                <a16:creationId xmlns:a16="http://schemas.microsoft.com/office/drawing/2014/main" id="{A82B224A-6991-47A1-BFE3-3B0EC64C127C}"/>
-              </a:ext>
-            </a:extLst>
-          </p:cNvPr>
-          <p:cNvSpPr txBox="1"/>
-          <p:nvPr/>
-        </p:nvSpPr>
-        <p:spPr>
-          <a:xfrm>
-            <a:off x="2322991" y="1647132"/>
-            <a:ext cx="461665" cy="3029523"/>
-          </a:xfrm>
-          <a:prstGeom prst="rect">
-            <a:avLst/>
-          </a:prstGeom>
-        </p:spPr>
-        <p:style>
-          <a:lnRef idx="0">
-            <a:schemeClr val="accent1"/>
-          </a:lnRef>
-          <a:fillRef idx="3">
-            <a:schemeClr val="accent1"/>
-          </a:fillRef>
-          <a:effectRef idx="3">
-            <a:schemeClr val="accent1"/>
-          </a:effectRef>
-          <a:fontRef idx="minor">
-            <a:schemeClr val="lt1"/>
-          </a:fontRef>
-        </p:style>
-        <p:txBody>
-          <a:bodyPr vert="vert270" wrap="square" rtlCol="0">
-            <a:spAutoFit/>
-          </a:bodyPr>
-          <a:lstStyle/>
-          <a:p>
-            <a:pPr algn="ctr"/>
-            <a:r>
-              <a:rPr lang="en-SG" altLang="zh-CN" dirty="0"/>
-              <a:t>ParserManager</a:t>
-            </a:r>
-          </a:p>
-        </p:txBody>
-      </p:sp>
-      <p:sp>
-        <p:nvSpPr>
-          <p:cNvPr id="77" name="TextBox 76">
-            <a:extLst>
-              <a:ext uri="{FF2B5EF4-FFF2-40B4-BE49-F238E27FC236}">
-                <a16:creationId xmlns:a16="http://schemas.microsoft.com/office/drawing/2014/main" id="{84C983A5-D9BA-413F-B147-9C06E4D09F50}"/>
-              </a:ext>
-            </a:extLst>
-          </p:cNvPr>
-          <p:cNvSpPr txBox="1"/>
-          <p:nvPr/>
-        </p:nvSpPr>
-        <p:spPr>
-          <a:xfrm rot="5400000">
-            <a:off x="5162586" y="2054710"/>
-            <a:ext cx="461665" cy="2754167"/>
-          </a:xfrm>
-          <a:prstGeom prst="rect">
-            <a:avLst/>
-          </a:prstGeom>
-        </p:spPr>
-        <p:style>
-          <a:lnRef idx="0">
-            <a:schemeClr val="accent1"/>
-          </a:lnRef>
-          <a:fillRef idx="3">
-            <a:schemeClr val="accent1"/>
-          </a:fillRef>
-          <a:effectRef idx="3">
-            <a:schemeClr val="accent1"/>
-          </a:effectRef>
-          <a:fontRef idx="minor">
-            <a:schemeClr val="lt1"/>
-          </a:fontRef>
-        </p:style>
-        <p:txBody>
-          <a:bodyPr vert="vert270" wrap="square" rtlCol="0">
-            <a:spAutoFit/>
-          </a:bodyPr>
-          <a:lstStyle/>
-          <a:p>
-            <a:pPr algn="ctr"/>
-            <a:r>
-              <a:rPr lang="en-SG" altLang="zh-CN" dirty="0"/>
-              <a:t>XYZCommandParser</a:t>
-            </a:r>
-            <a:endParaRPr lang="zh-CN" altLang="en-US" dirty="0"/>
-          </a:p>
-        </p:txBody>
-      </p:sp>
-      <p:sp>
-        <p:nvSpPr>
-          <p:cNvPr id="78" name="TextBox 77">
-            <a:extLst>
-              <a:ext uri="{FF2B5EF4-FFF2-40B4-BE49-F238E27FC236}">
-                <a16:creationId xmlns:a16="http://schemas.microsoft.com/office/drawing/2014/main" id="{18FFE8FA-9E6B-47D9-A39E-C88B40E40F12}"/>
-              </a:ext>
-            </a:extLst>
-          </p:cNvPr>
-          <p:cNvSpPr txBox="1"/>
-          <p:nvPr/>
-        </p:nvSpPr>
-        <p:spPr>
-          <a:xfrm rot="5400000">
-            <a:off x="9031584" y="2036886"/>
-            <a:ext cx="461665" cy="2758211"/>
-          </a:xfrm>
-          <a:prstGeom prst="rect">
-            <a:avLst/>
-          </a:prstGeom>
-        </p:spPr>
-        <p:style>
-          <a:lnRef idx="0">
-            <a:schemeClr val="accent1"/>
-          </a:lnRef>
-          <a:fillRef idx="3">
-            <a:schemeClr val="accent1"/>
-          </a:fillRef>
-          <a:effectRef idx="3">
-            <a:schemeClr val="accent1"/>
-          </a:effectRef>
-          <a:fontRef idx="minor">
-            <a:schemeClr val="lt1"/>
-          </a:fontRef>
-        </p:style>
-        <p:txBody>
-          <a:bodyPr vert="vert270" wrap="square" rtlCol="0">
-            <a:spAutoFit/>
-          </a:bodyPr>
-          <a:lstStyle/>
-          <a:p>
-            <a:pPr algn="ctr"/>
-            <a:r>
-              <a:rPr lang="en-SG" altLang="zh-CN" dirty="0"/>
-              <a:t>XYZCommand</a:t>
             </a:r>
             <a:endParaRPr lang="zh-CN" altLang="en-US" dirty="0"/>
           </a:p>
@@ -4235,13 +3987,15 @@
               </a:ext>
             </a:extLst>
           </p:cNvPr>
-          <p:cNvCxnSpPr/>
+          <p:cNvCxnSpPr>
+            <a:cxnSpLocks/>
+          </p:cNvCxnSpPr>
           <p:nvPr/>
         </p:nvCxnSpPr>
         <p:spPr>
           <a:xfrm>
-            <a:off x="5320317" y="2427900"/>
-            <a:ext cx="0" cy="844691"/>
+            <a:off x="5424105" y="1313550"/>
+            <a:ext cx="0" cy="584807"/>
           </a:xfrm>
           <a:prstGeom prst="line">
             <a:avLst/>
@@ -4279,7 +4033,7 @@
         </p:nvSpPr>
         <p:spPr>
           <a:xfrm>
-            <a:off x="5143428" y="2379774"/>
+            <a:off x="5247216" y="1265424"/>
             <a:ext cx="365757" cy="269508"/>
           </a:xfrm>
           <a:prstGeom prst="triangle">
@@ -4328,13 +4082,14 @@
           </p:cNvPr>
           <p:cNvCxnSpPr>
             <a:cxnSpLocks/>
+            <a:endCxn id="9" idx="0"/>
           </p:cNvCxnSpPr>
           <p:nvPr/>
         </p:nvCxnSpPr>
         <p:spPr>
           <a:xfrm flipH="1" flipV="1">
-            <a:off x="10801324" y="1435717"/>
-            <a:ext cx="52978" cy="3630973"/>
+            <a:off x="6293663" y="4126757"/>
+            <a:ext cx="2166944" cy="28914"/>
           </a:xfrm>
           <a:prstGeom prst="straightConnector1">
             <a:avLst/>
@@ -4374,7 +4129,7 @@
         </p:nvSpPr>
         <p:spPr>
           <a:xfrm>
-            <a:off x="1935399" y="2972398"/>
+            <a:off x="1597692" y="2327740"/>
             <a:ext cx="375268" cy="369332"/>
           </a:xfrm>
           <a:prstGeom prst="rect">
@@ -4422,7 +4177,7 @@
         </p:nvSpPr>
         <p:spPr>
           <a:xfrm>
-            <a:off x="6099794" y="5115000"/>
+            <a:off x="6719032" y="3138535"/>
             <a:ext cx="1337313" cy="369332"/>
           </a:xfrm>
           <a:prstGeom prst="rect">
@@ -4458,10 +4213,10 @@
       </p:sp>
       <p:sp>
         <p:nvSpPr>
-          <p:cNvPr id="111" name="TextBox 110">
-            <a:extLst>
-              <a:ext uri="{FF2B5EF4-FFF2-40B4-BE49-F238E27FC236}">
-                <a16:creationId xmlns:a16="http://schemas.microsoft.com/office/drawing/2014/main" id="{8EDA6960-69A3-4AD6-B591-4B5DAAA0E00E}"/>
+          <p:cNvPr id="113" name="TextBox 112">
+            <a:extLst>
+              <a:ext uri="{FF2B5EF4-FFF2-40B4-BE49-F238E27FC236}">
+                <a16:creationId xmlns:a16="http://schemas.microsoft.com/office/drawing/2014/main" id="{A9824DAC-702B-441A-8565-3617994EDDEC}"/>
               </a:ext>
             </a:extLst>
           </p:cNvPr>
@@ -4470,8 +4225,304 @@
         </p:nvSpPr>
         <p:spPr>
           <a:xfrm>
-            <a:off x="2911971" y="3352936"/>
-            <a:ext cx="992082" cy="369332"/>
+            <a:off x="6776399" y="3798846"/>
+            <a:ext cx="1337313" cy="369332"/>
+          </a:xfrm>
+          <a:prstGeom prst="rect">
+            <a:avLst/>
+          </a:prstGeom>
+          <a:noFill/>
+        </p:spPr>
+        <p:txBody>
+          <a:bodyPr wrap="square" rtlCol="0">
+            <a:spAutoFit/>
+          </a:bodyPr>
+          <a:lstStyle/>
+          <a:p>
+            <a:r>
+              <a:rPr lang="en-US" altLang="zh-CN" b="1" dirty="0">
+                <a:solidFill>
+                  <a:schemeClr val="accent1">
+                    <a:lumMod val="75000"/>
+                  </a:schemeClr>
+                </a:solidFill>
+              </a:rPr>
+              <a:t>produces</a:t>
+            </a:r>
+            <a:endParaRPr lang="zh-CN" altLang="en-US" b="1" dirty="0">
+              <a:solidFill>
+                <a:schemeClr val="accent1">
+                  <a:lumMod val="75000"/>
+                </a:schemeClr>
+              </a:solidFill>
+            </a:endParaRPr>
+          </a:p>
+        </p:txBody>
+      </p:sp>
+      <p:sp>
+        <p:nvSpPr>
+          <p:cNvPr id="115" name="Isosceles Triangle 114">
+            <a:extLst>
+              <a:ext uri="{FF2B5EF4-FFF2-40B4-BE49-F238E27FC236}">
+                <a16:creationId xmlns:a16="http://schemas.microsoft.com/office/drawing/2014/main" id="{C3ACE1A1-9150-4841-8E53-16F516FCA437}"/>
+              </a:ext>
+            </a:extLst>
+          </p:cNvPr>
+          <p:cNvSpPr/>
+          <p:nvPr/>
+        </p:nvSpPr>
+        <p:spPr>
+          <a:xfrm rot="5400000">
+            <a:off x="7762244" y="3252766"/>
+            <a:ext cx="155565" cy="152371"/>
+          </a:xfrm>
+          <a:prstGeom prst="triangle">
+            <a:avLst/>
+          </a:prstGeom>
+          <a:solidFill>
+            <a:schemeClr val="tx2"/>
+          </a:solidFill>
+        </p:spPr>
+        <p:style>
+          <a:lnRef idx="2">
+            <a:schemeClr val="accent1">
+              <a:shade val="50000"/>
+            </a:schemeClr>
+          </a:lnRef>
+          <a:fillRef idx="1">
+            <a:schemeClr val="accent1"/>
+          </a:fillRef>
+          <a:effectRef idx="0">
+            <a:schemeClr val="accent1"/>
+          </a:effectRef>
+          <a:fontRef idx="minor">
+            <a:schemeClr val="lt1"/>
+          </a:fontRef>
+        </p:style>
+        <p:txBody>
+          <a:bodyPr rtlCol="0" anchor="ctr"/>
+          <a:lstStyle/>
+          <a:p>
+            <a:pPr algn="ctr"/>
+            <a:endParaRPr lang="en-SG"/>
+          </a:p>
+        </p:txBody>
+      </p:sp>
+      <p:sp>
+        <p:nvSpPr>
+          <p:cNvPr id="116" name="Isosceles Triangle 115">
+            <a:extLst>
+              <a:ext uri="{FF2B5EF4-FFF2-40B4-BE49-F238E27FC236}">
+                <a16:creationId xmlns:a16="http://schemas.microsoft.com/office/drawing/2014/main" id="{8FCB8D2D-83EF-4A27-92B1-9C963BBD930A}"/>
+              </a:ext>
+            </a:extLst>
+          </p:cNvPr>
+          <p:cNvSpPr/>
+          <p:nvPr/>
+        </p:nvSpPr>
+        <p:spPr>
+          <a:xfrm rot="16200000">
+            <a:off x="6638960" y="3930174"/>
+            <a:ext cx="155565" cy="152371"/>
+          </a:xfrm>
+          <a:prstGeom prst="triangle">
+            <a:avLst/>
+          </a:prstGeom>
+          <a:solidFill>
+            <a:schemeClr val="tx2"/>
+          </a:solidFill>
+        </p:spPr>
+        <p:style>
+          <a:lnRef idx="2">
+            <a:schemeClr val="accent1">
+              <a:shade val="50000"/>
+            </a:schemeClr>
+          </a:lnRef>
+          <a:fillRef idx="1">
+            <a:schemeClr val="accent1"/>
+          </a:fillRef>
+          <a:effectRef idx="0">
+            <a:schemeClr val="accent1"/>
+          </a:effectRef>
+          <a:fontRef idx="minor">
+            <a:schemeClr val="lt1"/>
+          </a:fontRef>
+        </p:style>
+        <p:txBody>
+          <a:bodyPr rtlCol="0" anchor="ctr"/>
+          <a:lstStyle/>
+          <a:p>
+            <a:pPr algn="ctr"/>
+            <a:endParaRPr lang="en-SG"/>
+          </a:p>
+        </p:txBody>
+      </p:sp>
+      <p:cxnSp>
+        <p:nvCxnSpPr>
+          <p:cNvPr id="126" name="Straight Arrow Connector 125">
+            <a:extLst>
+              <a:ext uri="{FF2B5EF4-FFF2-40B4-BE49-F238E27FC236}">
+                <a16:creationId xmlns:a16="http://schemas.microsoft.com/office/drawing/2014/main" id="{667E11DF-D3C3-4D6A-BF42-46AB373FDA49}"/>
+              </a:ext>
+            </a:extLst>
+          </p:cNvPr>
+          <p:cNvCxnSpPr>
+            <a:cxnSpLocks/>
+          </p:cNvCxnSpPr>
+          <p:nvPr/>
+        </p:nvCxnSpPr>
+        <p:spPr>
+          <a:xfrm>
+            <a:off x="8909026" y="3894376"/>
+            <a:ext cx="0" cy="1021991"/>
+          </a:xfrm>
+          <a:prstGeom prst="straightConnector1">
+            <a:avLst/>
+          </a:prstGeom>
+          <a:ln w="28575">
+            <a:prstDash val="sysDot"/>
+            <a:headEnd type="none" w="med" len="med"/>
+            <a:tailEnd type="arrow" w="med" len="med"/>
+          </a:ln>
+        </p:spPr>
+        <p:style>
+          <a:lnRef idx="1">
+            <a:schemeClr val="accent1"/>
+          </a:lnRef>
+          <a:fillRef idx="0">
+            <a:schemeClr val="accent1"/>
+          </a:fillRef>
+          <a:effectRef idx="0">
+            <a:schemeClr val="accent1"/>
+          </a:effectRef>
+          <a:fontRef idx="minor">
+            <a:schemeClr val="tx1"/>
+          </a:fontRef>
+        </p:style>
+      </p:cxnSp>
+      <p:sp>
+        <p:nvSpPr>
+          <p:cNvPr id="60" name="TextBox 59">
+            <a:extLst>
+              <a:ext uri="{FF2B5EF4-FFF2-40B4-BE49-F238E27FC236}">
+                <a16:creationId xmlns:a16="http://schemas.microsoft.com/office/drawing/2014/main" id="{E39A0DF4-B41C-48F2-8C6C-B654EB128408}"/>
+              </a:ext>
+            </a:extLst>
+          </p:cNvPr>
+          <p:cNvSpPr txBox="1"/>
+          <p:nvPr/>
+        </p:nvSpPr>
+        <p:spPr>
+          <a:xfrm rot="5400000">
+            <a:off x="5054772" y="-70075"/>
+            <a:ext cx="738664" cy="1893139"/>
+          </a:xfrm>
+          <a:prstGeom prst="rect">
+            <a:avLst/>
+          </a:prstGeom>
+        </p:spPr>
+        <p:style>
+          <a:lnRef idx="0">
+            <a:schemeClr val="accent1"/>
+          </a:lnRef>
+          <a:fillRef idx="3">
+            <a:schemeClr val="accent1"/>
+          </a:fillRef>
+          <a:effectRef idx="3">
+            <a:schemeClr val="accent1"/>
+          </a:effectRef>
+          <a:fontRef idx="minor">
+            <a:schemeClr val="lt1"/>
+          </a:fontRef>
+        </p:style>
+        <p:txBody>
+          <a:bodyPr vert="vert270" wrap="square" rtlCol="0">
+            <a:spAutoFit/>
+          </a:bodyPr>
+          <a:lstStyle/>
+          <a:p>
+            <a:pPr algn="ctr"/>
+            <a:r>
+              <a:rPr lang="en-SG" altLang="zh-CN" dirty="0"/>
+              <a:t>&lt;&lt;interface&gt;&gt;</a:t>
+            </a:r>
+          </a:p>
+          <a:p>
+            <a:pPr algn="ctr"/>
+            <a:r>
+              <a:rPr lang="en-SG" altLang="zh-CN" dirty="0"/>
+              <a:t>CommandParser</a:t>
+            </a:r>
+            <a:endParaRPr lang="zh-CN" altLang="en-US" dirty="0"/>
+          </a:p>
+        </p:txBody>
+      </p:sp>
+      <p:sp>
+        <p:nvSpPr>
+          <p:cNvPr id="61" name="TextBox 60">
+            <a:extLst>
+              <a:ext uri="{FF2B5EF4-FFF2-40B4-BE49-F238E27FC236}">
+                <a16:creationId xmlns:a16="http://schemas.microsoft.com/office/drawing/2014/main" id="{B700D8CE-41F9-4442-B0D4-BB51F18F9300}"/>
+              </a:ext>
+            </a:extLst>
+          </p:cNvPr>
+          <p:cNvSpPr txBox="1"/>
+          <p:nvPr/>
+        </p:nvSpPr>
+        <p:spPr>
+          <a:xfrm rot="5400000">
+            <a:off x="8678194" y="1146552"/>
+            <a:ext cx="461665" cy="1843857"/>
+          </a:xfrm>
+          <a:prstGeom prst="rect">
+            <a:avLst/>
+          </a:prstGeom>
+        </p:spPr>
+        <p:style>
+          <a:lnRef idx="0">
+            <a:schemeClr val="accent1"/>
+          </a:lnRef>
+          <a:fillRef idx="3">
+            <a:schemeClr val="accent1"/>
+          </a:fillRef>
+          <a:effectRef idx="3">
+            <a:schemeClr val="accent1"/>
+          </a:effectRef>
+          <a:fontRef idx="minor">
+            <a:schemeClr val="lt1"/>
+          </a:fontRef>
+        </p:style>
+        <p:txBody>
+          <a:bodyPr vert="vert270" wrap="square" rtlCol="0">
+            <a:spAutoFit/>
+          </a:bodyPr>
+          <a:lstStyle/>
+          <a:p>
+            <a:pPr algn="ctr"/>
+            <a:r>
+              <a:rPr lang="en-SG" altLang="zh-CN" dirty="0"/>
+              <a:t>XYZCommand</a:t>
+            </a:r>
+            <a:endParaRPr lang="zh-CN" altLang="en-US" dirty="0"/>
+          </a:p>
+        </p:txBody>
+      </p:sp>
+      <p:sp>
+        <p:nvSpPr>
+          <p:cNvPr id="62" name="TextBox 61">
+            <a:extLst>
+              <a:ext uri="{FF2B5EF4-FFF2-40B4-BE49-F238E27FC236}">
+                <a16:creationId xmlns:a16="http://schemas.microsoft.com/office/drawing/2014/main" id="{4F0B51F9-AA25-443A-9424-21122955F54A}"/>
+              </a:ext>
+            </a:extLst>
+          </p:cNvPr>
+          <p:cNvSpPr txBox="1"/>
+          <p:nvPr/>
+        </p:nvSpPr>
+        <p:spPr>
+          <a:xfrm>
+            <a:off x="6846426" y="2006041"/>
+            <a:ext cx="1192237" cy="369332"/>
           </a:xfrm>
           <a:prstGeom prst="rect">
             <a:avLst/>
@@ -4506,58 +4557,10 @@
       </p:sp>
       <p:sp>
         <p:nvSpPr>
-          <p:cNvPr id="113" name="TextBox 112">
-            <a:extLst>
-              <a:ext uri="{FF2B5EF4-FFF2-40B4-BE49-F238E27FC236}">
-                <a16:creationId xmlns:a16="http://schemas.microsoft.com/office/drawing/2014/main" id="{A9824DAC-702B-441A-8565-3617994EDDEC}"/>
-              </a:ext>
-            </a:extLst>
-          </p:cNvPr>
-          <p:cNvSpPr txBox="1"/>
-          <p:nvPr/>
-        </p:nvSpPr>
-        <p:spPr>
-          <a:xfrm>
-            <a:off x="9655443" y="1805917"/>
-            <a:ext cx="1337313" cy="369332"/>
-          </a:xfrm>
-          <a:prstGeom prst="rect">
-            <a:avLst/>
-          </a:prstGeom>
-          <a:noFill/>
-        </p:spPr>
-        <p:txBody>
-          <a:bodyPr wrap="square" rtlCol="0">
-            <a:spAutoFit/>
-          </a:bodyPr>
-          <a:lstStyle/>
-          <a:p>
-            <a:r>
-              <a:rPr lang="en-US" altLang="zh-CN" b="1" dirty="0">
-                <a:solidFill>
-                  <a:schemeClr val="accent1">
-                    <a:lumMod val="75000"/>
-                  </a:schemeClr>
-                </a:solidFill>
-              </a:rPr>
-              <a:t>produces</a:t>
-            </a:r>
-            <a:endParaRPr lang="zh-CN" altLang="en-US" b="1" dirty="0">
-              <a:solidFill>
-                <a:schemeClr val="accent1">
-                  <a:lumMod val="75000"/>
-                </a:schemeClr>
-              </a:solidFill>
-            </a:endParaRPr>
-          </a:p>
-        </p:txBody>
-      </p:sp>
-      <p:sp>
-        <p:nvSpPr>
-          <p:cNvPr id="114" name="Isosceles Triangle 113">
-            <a:extLst>
-              <a:ext uri="{FF2B5EF4-FFF2-40B4-BE49-F238E27FC236}">
-                <a16:creationId xmlns:a16="http://schemas.microsoft.com/office/drawing/2014/main" id="{8F31183D-570A-4FF2-8C69-7B10957EF040}"/>
+          <p:cNvPr id="63" name="Isosceles Triangle 62">
+            <a:extLst>
+              <a:ext uri="{FF2B5EF4-FFF2-40B4-BE49-F238E27FC236}">
+                <a16:creationId xmlns:a16="http://schemas.microsoft.com/office/drawing/2014/main" id="{0F87F7C4-A86C-4972-9BDB-D2B454FA3EB3}"/>
               </a:ext>
             </a:extLst>
           </p:cNvPr>
@@ -4566,7 +4569,7 @@
         </p:nvSpPr>
         <p:spPr>
           <a:xfrm rot="5400000">
-            <a:off x="3776568" y="3487661"/>
+            <a:off x="7716629" y="2145741"/>
             <a:ext cx="155565" cy="152371"/>
           </a:xfrm>
           <a:prstGeom prst="triangle">
@@ -4603,10 +4606,10 @@
       </p:sp>
       <p:sp>
         <p:nvSpPr>
-          <p:cNvPr id="115" name="Isosceles Triangle 114">
-            <a:extLst>
-              <a:ext uri="{FF2B5EF4-FFF2-40B4-BE49-F238E27FC236}">
-                <a16:creationId xmlns:a16="http://schemas.microsoft.com/office/drawing/2014/main" id="{C3ACE1A1-9150-4841-8E53-16F516FCA437}"/>
+          <p:cNvPr id="64" name="Isosceles Triangle 63">
+            <a:extLst>
+              <a:ext uri="{FF2B5EF4-FFF2-40B4-BE49-F238E27FC236}">
+                <a16:creationId xmlns:a16="http://schemas.microsoft.com/office/drawing/2014/main" id="{2DC17196-6EAA-4460-87BE-3F67F7C5031F}"/>
               </a:ext>
             </a:extLst>
           </p:cNvPr>
@@ -4615,7 +4618,7 @@
         </p:nvSpPr>
         <p:spPr>
           <a:xfrm rot="5400000">
-            <a:off x="7143006" y="5229231"/>
+            <a:off x="3964823" y="2125723"/>
             <a:ext cx="155565" cy="152371"/>
           </a:xfrm>
           <a:prstGeom prst="triangle">
@@ -4650,74 +4653,25 @@
           </a:p>
         </p:txBody>
       </p:sp>
-      <p:sp>
-        <p:nvSpPr>
-          <p:cNvPr id="116" name="Isosceles Triangle 115">
-            <a:extLst>
-              <a:ext uri="{FF2B5EF4-FFF2-40B4-BE49-F238E27FC236}">
-                <a16:creationId xmlns:a16="http://schemas.microsoft.com/office/drawing/2014/main" id="{8FCB8D2D-83EF-4A27-92B1-9C963BBD930A}"/>
-              </a:ext>
-            </a:extLst>
-          </p:cNvPr>
-          <p:cNvSpPr/>
-          <p:nvPr/>
-        </p:nvSpPr>
-        <p:spPr>
-          <a:xfrm>
-            <a:off x="10412757" y="1628222"/>
-            <a:ext cx="155565" cy="152371"/>
-          </a:xfrm>
-          <a:prstGeom prst="triangle">
-            <a:avLst/>
-          </a:prstGeom>
-          <a:solidFill>
-            <a:schemeClr val="tx2"/>
-          </a:solidFill>
-        </p:spPr>
-        <p:style>
-          <a:lnRef idx="2">
-            <a:schemeClr val="accent1">
-              <a:shade val="50000"/>
-            </a:schemeClr>
-          </a:lnRef>
-          <a:fillRef idx="1">
-            <a:schemeClr val="accent1"/>
-          </a:fillRef>
-          <a:effectRef idx="0">
-            <a:schemeClr val="accent1"/>
-          </a:effectRef>
-          <a:fontRef idx="minor">
-            <a:schemeClr val="lt1"/>
-          </a:fontRef>
-        </p:style>
-        <p:txBody>
-          <a:bodyPr rtlCol="0" anchor="ctr"/>
-          <a:lstStyle/>
-          <a:p>
-            <a:pPr algn="ctr"/>
-            <a:endParaRPr lang="en-SG"/>
-          </a:p>
-        </p:txBody>
-      </p:sp>
       <p:cxnSp>
         <p:nvCxnSpPr>
-          <p:cNvPr id="117" name="Straight Arrow Connector 116">
-            <a:extLst>
-              <a:ext uri="{FF2B5EF4-FFF2-40B4-BE49-F238E27FC236}">
-                <a16:creationId xmlns:a16="http://schemas.microsoft.com/office/drawing/2014/main" id="{92224D99-43CA-4A9D-AD9C-E6C9EBA09C92}"/>
+          <p:cNvPr id="65" name="Straight Arrow Connector 64">
+            <a:extLst>
+              <a:ext uri="{FF2B5EF4-FFF2-40B4-BE49-F238E27FC236}">
+                <a16:creationId xmlns:a16="http://schemas.microsoft.com/office/drawing/2014/main" id="{34EC03B2-1464-40A3-972F-8489A9762E55}"/>
               </a:ext>
             </a:extLst>
           </p:cNvPr>
           <p:cNvCxnSpPr>
             <a:cxnSpLocks/>
-            <a:endCxn id="78" idx="2"/>
+            <a:endCxn id="67" idx="2"/>
           </p:cNvCxnSpPr>
           <p:nvPr/>
         </p:nvCxnSpPr>
         <p:spPr>
-          <a:xfrm>
-            <a:off x="6775871" y="3415992"/>
-            <a:ext cx="1107440" cy="0"/>
+          <a:xfrm flipV="1">
+            <a:off x="2819275" y="2072510"/>
+            <a:ext cx="1834143" cy="3442"/>
           </a:xfrm>
           <a:prstGeom prst="straightConnector1">
             <a:avLst/>
@@ -4745,10 +4699,10 @@
       </p:cxnSp>
       <p:sp>
         <p:nvSpPr>
-          <p:cNvPr id="124" name="TextBox 123">
-            <a:extLst>
-              <a:ext uri="{FF2B5EF4-FFF2-40B4-BE49-F238E27FC236}">
-                <a16:creationId xmlns:a16="http://schemas.microsoft.com/office/drawing/2014/main" id="{B08E1C0E-391E-46B7-AC91-FD22AF8C0943}"/>
+          <p:cNvPr id="66" name="TextBox 65">
+            <a:extLst>
+              <a:ext uri="{FF2B5EF4-FFF2-40B4-BE49-F238E27FC236}">
+                <a16:creationId xmlns:a16="http://schemas.microsoft.com/office/drawing/2014/main" id="{00B96983-F9F7-418F-BA69-5D3372CF55AB}"/>
               </a:ext>
             </a:extLst>
           </p:cNvPr>
@@ -4756,9 +4710,108 @@
           <p:nvPr/>
         </p:nvSpPr>
         <p:spPr>
+          <a:xfrm rot="5400000">
+            <a:off x="1714513" y="1015504"/>
+            <a:ext cx="461665" cy="2105394"/>
+          </a:xfrm>
+          <a:prstGeom prst="rect">
+            <a:avLst/>
+          </a:prstGeom>
+        </p:spPr>
+        <p:style>
+          <a:lnRef idx="0">
+            <a:schemeClr val="accent1"/>
+          </a:lnRef>
+          <a:fillRef idx="3">
+            <a:schemeClr val="accent1"/>
+          </a:fillRef>
+          <a:effectRef idx="3">
+            <a:schemeClr val="accent1"/>
+          </a:effectRef>
+          <a:fontRef idx="minor">
+            <a:schemeClr val="lt1"/>
+          </a:fontRef>
+        </p:style>
+        <p:txBody>
+          <a:bodyPr vert="vert270" wrap="square" rtlCol="0">
+            <a:spAutoFit/>
+          </a:bodyPr>
+          <a:lstStyle/>
+          <a:p>
+            <a:pPr algn="ctr"/>
+            <a:r>
+              <a:rPr lang="en-SG" altLang="zh-CN" dirty="0"/>
+              <a:t>ParserManager</a:t>
+            </a:r>
+          </a:p>
+        </p:txBody>
+      </p:sp>
+      <p:sp>
+        <p:nvSpPr>
+          <p:cNvPr id="67" name="TextBox 66">
+            <a:extLst>
+              <a:ext uri="{FF2B5EF4-FFF2-40B4-BE49-F238E27FC236}">
+                <a16:creationId xmlns:a16="http://schemas.microsoft.com/office/drawing/2014/main" id="{4DEFB2E9-709C-449B-A7F9-C4A292C49945}"/>
+              </a:ext>
+            </a:extLst>
+          </p:cNvPr>
+          <p:cNvSpPr txBox="1"/>
+          <p:nvPr/>
+        </p:nvSpPr>
+        <p:spPr>
+          <a:xfrm rot="5400000">
+            <a:off x="5533021" y="962073"/>
+            <a:ext cx="461665" cy="2220872"/>
+          </a:xfrm>
+          <a:prstGeom prst="rect">
+            <a:avLst/>
+          </a:prstGeom>
+        </p:spPr>
+        <p:style>
+          <a:lnRef idx="0">
+            <a:schemeClr val="accent1"/>
+          </a:lnRef>
+          <a:fillRef idx="3">
+            <a:schemeClr val="accent1"/>
+          </a:fillRef>
+          <a:effectRef idx="3">
+            <a:schemeClr val="accent1"/>
+          </a:effectRef>
+          <a:fontRef idx="minor">
+            <a:schemeClr val="lt1"/>
+          </a:fontRef>
+        </p:style>
+        <p:txBody>
+          <a:bodyPr vert="vert270" wrap="square" rtlCol="0">
+            <a:spAutoFit/>
+          </a:bodyPr>
+          <a:lstStyle/>
+          <a:p>
+            <a:pPr algn="ctr"/>
+            <a:r>
+              <a:rPr lang="en-SG" altLang="zh-CN" dirty="0"/>
+              <a:t>XYZCommandParser</a:t>
+            </a:r>
+            <a:endParaRPr lang="zh-CN" altLang="en-US" dirty="0"/>
+          </a:p>
+        </p:txBody>
+      </p:sp>
+      <p:sp>
+        <p:nvSpPr>
+          <p:cNvPr id="68" name="TextBox 67">
+            <a:extLst>
+              <a:ext uri="{FF2B5EF4-FFF2-40B4-BE49-F238E27FC236}">
+                <a16:creationId xmlns:a16="http://schemas.microsoft.com/office/drawing/2014/main" id="{F18A034D-BA95-47C0-90F5-C657AB194F55}"/>
+              </a:ext>
+            </a:extLst>
+          </p:cNvPr>
+          <p:cNvSpPr txBox="1"/>
+          <p:nvPr/>
+        </p:nvSpPr>
+        <p:spPr>
           <a:xfrm>
-            <a:off x="6742638" y="3361019"/>
-            <a:ext cx="1192237" cy="369332"/>
+            <a:off x="3015759" y="1997960"/>
+            <a:ext cx="992082" cy="369332"/>
           </a:xfrm>
           <a:prstGeom prst="rect">
             <a:avLst/>
@@ -4791,61 +4844,12 @@
           </a:p>
         </p:txBody>
       </p:sp>
-      <p:sp>
-        <p:nvSpPr>
-          <p:cNvPr id="125" name="Isosceles Triangle 124">
-            <a:extLst>
-              <a:ext uri="{FF2B5EF4-FFF2-40B4-BE49-F238E27FC236}">
-                <a16:creationId xmlns:a16="http://schemas.microsoft.com/office/drawing/2014/main" id="{92673013-D38B-48AD-ABE9-1AB3032A893C}"/>
-              </a:ext>
-            </a:extLst>
-          </p:cNvPr>
-          <p:cNvSpPr/>
-          <p:nvPr/>
-        </p:nvSpPr>
-        <p:spPr>
-          <a:xfrm rot="5400000">
-            <a:off x="7640774" y="3475250"/>
-            <a:ext cx="155565" cy="152371"/>
-          </a:xfrm>
-          <a:prstGeom prst="triangle">
-            <a:avLst/>
-          </a:prstGeom>
-          <a:solidFill>
-            <a:schemeClr val="tx2"/>
-          </a:solidFill>
-        </p:spPr>
-        <p:style>
-          <a:lnRef idx="2">
-            <a:schemeClr val="accent1">
-              <a:shade val="50000"/>
-            </a:schemeClr>
-          </a:lnRef>
-          <a:fillRef idx="1">
-            <a:schemeClr val="accent1"/>
-          </a:fillRef>
-          <a:effectRef idx="0">
-            <a:schemeClr val="accent1"/>
-          </a:effectRef>
-          <a:fontRef idx="minor">
-            <a:schemeClr val="lt1"/>
-          </a:fontRef>
-        </p:style>
-        <p:txBody>
-          <a:bodyPr rtlCol="0" anchor="ctr"/>
-          <a:lstStyle/>
-          <a:p>
-            <a:pPr algn="ctr"/>
-            <a:endParaRPr lang="en-SG"/>
-          </a:p>
-        </p:txBody>
-      </p:sp>
       <p:cxnSp>
         <p:nvCxnSpPr>
-          <p:cNvPr id="126" name="Straight Arrow Connector 125">
-            <a:extLst>
-              <a:ext uri="{FF2B5EF4-FFF2-40B4-BE49-F238E27FC236}">
-                <a16:creationId xmlns:a16="http://schemas.microsoft.com/office/drawing/2014/main" id="{667E11DF-D3C3-4D6A-BF42-46AB373FDA49}"/>
+          <p:cNvPr id="87" name="Straight Arrow Connector 86">
+            <a:extLst>
+              <a:ext uri="{FF2B5EF4-FFF2-40B4-BE49-F238E27FC236}">
+                <a16:creationId xmlns:a16="http://schemas.microsoft.com/office/drawing/2014/main" id="{BDF41C12-696D-404E-84E2-1F4DEFB1297A}"/>
               </a:ext>
             </a:extLst>
           </p:cNvPr>
@@ -4855,9 +4859,9 @@
           <p:nvPr/>
         </p:nvCxnSpPr>
         <p:spPr>
-          <a:xfrm>
-            <a:off x="10135402" y="5402964"/>
-            <a:ext cx="0" cy="475131"/>
+          <a:xfrm flipV="1">
+            <a:off x="2819275" y="3755879"/>
+            <a:ext cx="0" cy="398837"/>
           </a:xfrm>
           <a:prstGeom prst="straightConnector1">
             <a:avLst/>
@@ -4883,6 +4887,359 @@
           </a:fontRef>
         </p:style>
       </p:cxnSp>
+      <p:cxnSp>
+        <p:nvCxnSpPr>
+          <p:cNvPr id="92" name="Straight Connector 91">
+            <a:extLst>
+              <a:ext uri="{FF2B5EF4-FFF2-40B4-BE49-F238E27FC236}">
+                <a16:creationId xmlns:a16="http://schemas.microsoft.com/office/drawing/2014/main" id="{64E24A8F-43CF-4BB4-B271-D00E4D7F29F6}"/>
+              </a:ext>
+            </a:extLst>
+          </p:cNvPr>
+          <p:cNvCxnSpPr>
+            <a:cxnSpLocks/>
+          </p:cNvCxnSpPr>
+          <p:nvPr/>
+        </p:nvCxnSpPr>
+        <p:spPr>
+          <a:xfrm flipV="1">
+            <a:off x="2815371" y="4144122"/>
+            <a:ext cx="1474478" cy="673"/>
+          </a:xfrm>
+          <a:prstGeom prst="line">
+            <a:avLst/>
+          </a:prstGeom>
+          <a:ln w="28575">
+            <a:prstDash val="sysDot"/>
+          </a:ln>
+        </p:spPr>
+        <p:style>
+          <a:lnRef idx="1">
+            <a:schemeClr val="accent1"/>
+          </a:lnRef>
+          <a:fillRef idx="0">
+            <a:schemeClr val="accent1"/>
+          </a:fillRef>
+          <a:effectRef idx="0">
+            <a:schemeClr val="accent1"/>
+          </a:effectRef>
+          <a:fontRef idx="minor">
+            <a:schemeClr val="tx1"/>
+          </a:fontRef>
+        </p:style>
+      </p:cxnSp>
+      <p:sp>
+        <p:nvSpPr>
+          <p:cNvPr id="99" name="Rectangle: Rounded Corners 98">
+            <a:extLst>
+              <a:ext uri="{FF2B5EF4-FFF2-40B4-BE49-F238E27FC236}">
+                <a16:creationId xmlns:a16="http://schemas.microsoft.com/office/drawing/2014/main" id="{589AE2B6-5B07-4568-9F61-4259365FE076}"/>
+              </a:ext>
+            </a:extLst>
+          </p:cNvPr>
+          <p:cNvSpPr/>
+          <p:nvPr/>
+        </p:nvSpPr>
+        <p:spPr>
+          <a:xfrm>
+            <a:off x="537409" y="5830541"/>
+            <a:ext cx="11213432" cy="770929"/>
+          </a:xfrm>
+          <a:prstGeom prst="roundRect">
+            <a:avLst/>
+          </a:prstGeom>
+          <a:solidFill>
+            <a:schemeClr val="accent6">
+              <a:lumMod val="40000"/>
+              <a:lumOff val="60000"/>
+            </a:schemeClr>
+          </a:solidFill>
+        </p:spPr>
+        <p:style>
+          <a:lnRef idx="2">
+            <a:schemeClr val="accent1">
+              <a:shade val="50000"/>
+            </a:schemeClr>
+          </a:lnRef>
+          <a:fillRef idx="1">
+            <a:schemeClr val="accent1"/>
+          </a:fillRef>
+          <a:effectRef idx="0">
+            <a:schemeClr val="accent1"/>
+          </a:effectRef>
+          <a:fontRef idx="minor">
+            <a:schemeClr val="lt1"/>
+          </a:fontRef>
+        </p:style>
+        <p:txBody>
+          <a:bodyPr rtlCol="0" anchor="ctr"/>
+          <a:lstStyle/>
+          <a:p>
+            <a:pPr algn="ctr"/>
+            <a:r>
+              <a:rPr lang="en-SG" altLang="zh-CN" dirty="0">
+                <a:solidFill>
+                  <a:srgbClr val="FF0000"/>
+                </a:solidFill>
+              </a:rPr>
+              <a:t>Storage</a:t>
+            </a:r>
+            <a:endParaRPr lang="zh-CN" altLang="en-US" dirty="0">
+              <a:solidFill>
+                <a:srgbClr val="FF0000"/>
+              </a:solidFill>
+            </a:endParaRPr>
+          </a:p>
+        </p:txBody>
+      </p:sp>
+      <p:cxnSp>
+        <p:nvCxnSpPr>
+          <p:cNvPr id="100" name="Straight Arrow Connector 99">
+            <a:extLst>
+              <a:ext uri="{FF2B5EF4-FFF2-40B4-BE49-F238E27FC236}">
+                <a16:creationId xmlns:a16="http://schemas.microsoft.com/office/drawing/2014/main" id="{EC9B511F-7489-4C45-A95B-E319A8801A2D}"/>
+              </a:ext>
+            </a:extLst>
+          </p:cNvPr>
+          <p:cNvCxnSpPr>
+            <a:cxnSpLocks/>
+          </p:cNvCxnSpPr>
+          <p:nvPr/>
+        </p:nvCxnSpPr>
+        <p:spPr>
+          <a:xfrm flipH="1">
+            <a:off x="1785326" y="3732376"/>
+            <a:ext cx="24224" cy="2098165"/>
+          </a:xfrm>
+          <a:prstGeom prst="straightConnector1">
+            <a:avLst/>
+          </a:prstGeom>
+          <a:ln w="28575">
+            <a:headEnd type="none" w="med" len="med"/>
+            <a:tailEnd type="arrow" w="med" len="med"/>
+          </a:ln>
+        </p:spPr>
+        <p:style>
+          <a:lnRef idx="1">
+            <a:schemeClr val="accent1"/>
+          </a:lnRef>
+          <a:fillRef idx="0">
+            <a:schemeClr val="accent1"/>
+          </a:fillRef>
+          <a:effectRef idx="0">
+            <a:schemeClr val="accent1"/>
+          </a:effectRef>
+          <a:fontRef idx="minor">
+            <a:schemeClr val="tx1"/>
+          </a:fontRef>
+        </p:style>
+      </p:cxnSp>
+      <p:sp>
+        <p:nvSpPr>
+          <p:cNvPr id="107" name="Folded Corner 126">
+            <a:extLst>
+              <a:ext uri="{FF2B5EF4-FFF2-40B4-BE49-F238E27FC236}">
+                <a16:creationId xmlns:a16="http://schemas.microsoft.com/office/drawing/2014/main" id="{A5762267-4EA7-43DC-BF19-04AD1714E631}"/>
+              </a:ext>
+            </a:extLst>
+          </p:cNvPr>
+          <p:cNvSpPr/>
+          <p:nvPr/>
+        </p:nvSpPr>
+        <p:spPr>
+          <a:xfrm>
+            <a:off x="6583679" y="305405"/>
+            <a:ext cx="2002034" cy="1258441"/>
+          </a:xfrm>
+          <a:prstGeom prst="foldedCorner">
+            <a:avLst/>
+          </a:prstGeom>
+          <a:solidFill>
+            <a:schemeClr val="accent5">
+              <a:lumMod val="60000"/>
+              <a:lumOff val="40000"/>
+            </a:schemeClr>
+          </a:solidFill>
+          <a:ln w="19050">
+            <a:solidFill>
+              <a:schemeClr val="tx1"/>
+            </a:solidFill>
+          </a:ln>
+          <a:effectLst/>
+        </p:spPr>
+        <p:style>
+          <a:lnRef idx="1">
+            <a:schemeClr val="accent2"/>
+          </a:lnRef>
+          <a:fillRef idx="2">
+            <a:schemeClr val="accent2"/>
+          </a:fillRef>
+          <a:effectRef idx="1">
+            <a:schemeClr val="accent2"/>
+          </a:effectRef>
+          <a:fontRef idx="minor">
+            <a:schemeClr val="dk1"/>
+          </a:fontRef>
+        </p:style>
+        <p:txBody>
+          <a:bodyPr rtlCol="0" anchor="ctr"/>
+          <a:lstStyle/>
+          <a:p>
+            <a:pPr algn="ctr"/>
+            <a:r>
+              <a:rPr lang="en-US" dirty="0" err="1">
+                <a:solidFill>
+                  <a:schemeClr val="tx1"/>
+                </a:solidFill>
+              </a:rPr>
+              <a:t>XYZCommand</a:t>
+            </a:r>
+            <a:r>
+              <a:rPr lang="en-US" dirty="0">
+                <a:solidFill>
+                  <a:schemeClr val="tx1"/>
+                </a:solidFill>
+              </a:rPr>
+              <a:t> = </a:t>
+            </a:r>
+            <a:r>
+              <a:rPr lang="en-US" dirty="0" err="1">
+                <a:solidFill>
+                  <a:schemeClr val="tx1"/>
+                </a:solidFill>
+              </a:rPr>
+              <a:t>DoneCommand</a:t>
+            </a:r>
+            <a:r>
+              <a:rPr lang="en-US" dirty="0">
+                <a:solidFill>
+                  <a:schemeClr val="tx1"/>
+                </a:solidFill>
+              </a:rPr>
+              <a:t>, </a:t>
+            </a:r>
+            <a:r>
+              <a:rPr lang="en-US" dirty="0" err="1">
+                <a:solidFill>
+                  <a:schemeClr val="tx1"/>
+                </a:solidFill>
+              </a:rPr>
+              <a:t>DeleteCommand</a:t>
+            </a:r>
+            <a:r>
+              <a:rPr lang="en-US" dirty="0">
+                <a:solidFill>
+                  <a:schemeClr val="tx1"/>
+                </a:solidFill>
+              </a:rPr>
+              <a:t>, etc.</a:t>
+            </a:r>
+          </a:p>
+        </p:txBody>
+      </p:sp>
+      <p:sp>
+        <p:nvSpPr>
+          <p:cNvPr id="110" name="Folded Corner 126">
+            <a:extLst>
+              <a:ext uri="{FF2B5EF4-FFF2-40B4-BE49-F238E27FC236}">
+                <a16:creationId xmlns:a16="http://schemas.microsoft.com/office/drawing/2014/main" id="{43C25F0E-AA5A-42A9-91C7-D454FBA8480D}"/>
+              </a:ext>
+            </a:extLst>
+          </p:cNvPr>
+          <p:cNvSpPr/>
+          <p:nvPr/>
+        </p:nvSpPr>
+        <p:spPr>
+          <a:xfrm>
+            <a:off x="8796737" y="282777"/>
+            <a:ext cx="2507433" cy="1322489"/>
+          </a:xfrm>
+          <a:prstGeom prst="foldedCorner">
+            <a:avLst/>
+          </a:prstGeom>
+          <a:solidFill>
+            <a:schemeClr val="accent5">
+              <a:lumMod val="60000"/>
+              <a:lumOff val="40000"/>
+            </a:schemeClr>
+          </a:solidFill>
+          <a:ln w="19050">
+            <a:solidFill>
+              <a:schemeClr val="tx1"/>
+            </a:solidFill>
+          </a:ln>
+          <a:effectLst/>
+        </p:spPr>
+        <p:style>
+          <a:lnRef idx="1">
+            <a:schemeClr val="accent2"/>
+          </a:lnRef>
+          <a:fillRef idx="2">
+            <a:schemeClr val="accent2"/>
+          </a:fillRef>
+          <a:effectRef idx="1">
+            <a:schemeClr val="accent2"/>
+          </a:effectRef>
+          <a:fontRef idx="minor">
+            <a:schemeClr val="dk1"/>
+          </a:fontRef>
+        </p:style>
+        <p:txBody>
+          <a:bodyPr rtlCol="0" anchor="ctr"/>
+          <a:lstStyle/>
+          <a:p>
+            <a:pPr algn="ctr"/>
+            <a:r>
+              <a:rPr lang="en-US" dirty="0" err="1">
+                <a:solidFill>
+                  <a:schemeClr val="tx1"/>
+                </a:solidFill>
+              </a:rPr>
+              <a:t>XYZCommandParser</a:t>
+            </a:r>
+            <a:r>
+              <a:rPr lang="en-US" dirty="0">
+                <a:solidFill>
+                  <a:schemeClr val="tx1"/>
+                </a:solidFill>
+              </a:rPr>
+              <a:t> = </a:t>
+            </a:r>
+            <a:r>
+              <a:rPr lang="en-US" dirty="0" err="1">
+                <a:solidFill>
+                  <a:schemeClr val="tx1"/>
+                </a:solidFill>
+              </a:rPr>
+              <a:t>DoneCommandParser</a:t>
+            </a:r>
+            <a:r>
+              <a:rPr lang="en-US" dirty="0">
+                <a:solidFill>
+                  <a:schemeClr val="tx1"/>
+                </a:solidFill>
+              </a:rPr>
+              <a:t>, </a:t>
+            </a:r>
+            <a:r>
+              <a:rPr lang="en-US" dirty="0" err="1">
+                <a:solidFill>
+                  <a:schemeClr val="tx1"/>
+                </a:solidFill>
+              </a:rPr>
+              <a:t>DeleteCommandParser</a:t>
+            </a:r>
+            <a:r>
+              <a:rPr lang="en-US" dirty="0">
+                <a:solidFill>
+                  <a:schemeClr val="tx1"/>
+                </a:solidFill>
+              </a:rPr>
+              <a:t>, etc.</a:t>
+            </a:r>
+          </a:p>
+        </p:txBody>
+      </p:sp>
     </p:spTree>
     <p:extLst>
       <p:ext uri="{BB962C8B-B14F-4D97-AF65-F5344CB8AC3E}">

</xml_diff>